<commit_message>
Deployed 29d2683 with MkDocs version: 1.5.3
</commit_message>
<xml_diff>
--- a/sims/bathtub/Bathtub-Simulation.pptx
+++ b/sims/bathtub/Bathtub-Simulation.pptx
@@ -7,6 +7,11 @@
   <p:sldIdLst>
     <p:sldId id="256" r:id="rId2"/>
     <p:sldId id="257" r:id="rId3"/>
+    <p:sldId id="258" r:id="rId4"/>
+    <p:sldId id="259" r:id="rId5"/>
+    <p:sldId id="261" r:id="rId6"/>
+    <p:sldId id="262" r:id="rId7"/>
+    <p:sldId id="260" r:id="rId8"/>
   </p:sldIdLst>
   <p:sldSz cx="12192000" cy="6858000"/>
   <p:notesSz cx="6858000" cy="9144000"/>
@@ -3419,7 +3424,7 @@
         </p:nvSpPr>
         <p:spPr>
           <a:xfrm rot="5400000">
-            <a:off x="4479799" y="5060854"/>
+            <a:off x="4604356" y="4590783"/>
             <a:ext cx="191752" cy="712424"/>
           </a:xfrm>
           <a:prstGeom prst="can">
@@ -3467,7 +3472,12 @@
             <p:ph type="title"/>
           </p:nvPr>
         </p:nvSpPr>
-        <p:spPr/>
+        <p:spPr>
+          <a:xfrm>
+            <a:off x="428480" y="158142"/>
+            <a:ext cx="10515600" cy="756732"/>
+          </a:xfrm>
+        </p:spPr>
         <p:txBody>
           <a:bodyPr/>
           <a:lstStyle/>
@@ -3493,7 +3503,7 @@
         </p:nvSpPr>
         <p:spPr>
           <a:xfrm>
-            <a:off x="1817283" y="2857040"/>
+            <a:off x="1941973" y="2289004"/>
             <a:ext cx="2770909" cy="2757055"/>
           </a:xfrm>
           <a:prstGeom prst="rect">
@@ -3542,7 +3552,7 @@
         </p:nvCxnSpPr>
         <p:spPr>
           <a:xfrm>
-            <a:off x="1817283" y="2456760"/>
+            <a:off x="1941973" y="1888724"/>
             <a:ext cx="0" cy="3157335"/>
           </a:xfrm>
           <a:prstGeom prst="line">
@@ -3583,7 +3593,7 @@
         </p:nvCxnSpPr>
         <p:spPr>
           <a:xfrm>
-            <a:off x="4574838" y="2456760"/>
+            <a:off x="4699528" y="1888724"/>
             <a:ext cx="0" cy="3157335"/>
           </a:xfrm>
           <a:prstGeom prst="line">
@@ -3626,7 +3636,7 @@
         </p:nvCxnSpPr>
         <p:spPr>
           <a:xfrm>
-            <a:off x="1817283" y="5618769"/>
+            <a:off x="1941973" y="5050733"/>
             <a:ext cx="2770909" cy="0"/>
           </a:xfrm>
           <a:prstGeom prst="line">
@@ -3667,7 +3677,7 @@
         </p:nvSpPr>
         <p:spPr>
           <a:xfrm rot="5400000">
-            <a:off x="1334209" y="1884550"/>
+            <a:off x="1458899" y="1316514"/>
             <a:ext cx="206983" cy="932762"/>
           </a:xfrm>
           <a:prstGeom prst="can">
@@ -3713,7 +3723,7 @@
         </p:nvSpPr>
         <p:spPr>
           <a:xfrm>
-            <a:off x="4746083" y="4846031"/>
+            <a:off x="4870773" y="4277995"/>
             <a:ext cx="736099" cy="369332"/>
           </a:xfrm>
           <a:prstGeom prst="rect">
@@ -3750,7 +3760,7 @@
         </p:nvSpPr>
         <p:spPr>
           <a:xfrm>
-            <a:off x="971319" y="1860844"/>
+            <a:off x="1096009" y="1292808"/>
             <a:ext cx="915635" cy="369332"/>
           </a:xfrm>
           <a:prstGeom prst="rect">
@@ -3789,7 +3799,7 @@
         </p:nvCxnSpPr>
         <p:spPr>
           <a:xfrm flipV="1">
-            <a:off x="1614472" y="2857039"/>
+            <a:off x="1739162" y="2289003"/>
             <a:ext cx="7853" cy="2757056"/>
           </a:xfrm>
           <a:prstGeom prst="straightConnector1">
@@ -3831,7 +3841,7 @@
         </p:nvSpPr>
         <p:spPr>
           <a:xfrm>
-            <a:off x="567999" y="3981494"/>
+            <a:off x="692689" y="3413458"/>
             <a:ext cx="851515" cy="646331"/>
           </a:xfrm>
           <a:prstGeom prst="rect">
@@ -3880,7 +3890,7 @@
         </p:nvCxnSpPr>
         <p:spPr>
           <a:xfrm flipV="1">
-            <a:off x="6909155" y="2863336"/>
+            <a:off x="7033845" y="2295300"/>
             <a:ext cx="7853" cy="2757056"/>
           </a:xfrm>
           <a:prstGeom prst="straightConnector1">
@@ -3924,7 +3934,7 @@
         </p:nvCxnSpPr>
         <p:spPr>
           <a:xfrm>
-            <a:off x="6909155" y="5620392"/>
+            <a:off x="7033845" y="5052356"/>
             <a:ext cx="3512498" cy="0"/>
           </a:xfrm>
           <a:prstGeom prst="straightConnector1">
@@ -3966,7 +3976,7 @@
         </p:nvSpPr>
         <p:spPr>
           <a:xfrm>
-            <a:off x="7224470" y="2454423"/>
+            <a:off x="7349160" y="1886387"/>
             <a:ext cx="3063916" cy="369332"/>
           </a:xfrm>
           <a:prstGeom prst="rect">
@@ -4001,7 +4011,7 @@
         </p:nvSpPr>
         <p:spPr>
           <a:xfrm>
-            <a:off x="9685554" y="5721708"/>
+            <a:off x="9810244" y="5153672"/>
             <a:ext cx="689163" cy="369332"/>
           </a:xfrm>
           <a:prstGeom prst="rect">
@@ -4038,7 +4048,7 @@
         </p:nvSpPr>
         <p:spPr>
           <a:xfrm>
-            <a:off x="6109748" y="2678670"/>
+            <a:off x="6234438" y="2110634"/>
             <a:ext cx="851515" cy="646331"/>
           </a:xfrm>
           <a:prstGeom prst="rect">
@@ -4086,7 +4096,7 @@
         </p:nvSpPr>
         <p:spPr>
           <a:xfrm>
-            <a:off x="6986887" y="3037736"/>
+            <a:off x="7111577" y="2469700"/>
             <a:ext cx="3268983" cy="2491958"/>
           </a:xfrm>
           <a:custGeom>
@@ -4172,10 +4182,2186 @@
           </a:p>
         </p:txBody>
       </p:sp>
+      <p:sp>
+        <p:nvSpPr>
+          <p:cNvPr id="27" name="Freeform 26">
+            <a:extLst>
+              <a:ext uri="{FF2B5EF4-FFF2-40B4-BE49-F238E27FC236}">
+                <a16:creationId xmlns:a16="http://schemas.microsoft.com/office/drawing/2014/main" id="{8EE2CFD8-7050-4547-FF43-B6AC5746FB40}"/>
+              </a:ext>
+            </a:extLst>
+          </p:cNvPr>
+          <p:cNvSpPr/>
+          <p:nvPr/>
+        </p:nvSpPr>
+        <p:spPr>
+          <a:xfrm>
+            <a:off x="5082068" y="4919804"/>
+            <a:ext cx="346363" cy="526473"/>
+          </a:xfrm>
+          <a:custGeom>
+            <a:avLst/>
+            <a:gdLst>
+              <a:gd name="connsiteX0" fmla="*/ 0 w 346363"/>
+              <a:gd name="connsiteY0" fmla="*/ 0 h 526473"/>
+              <a:gd name="connsiteX1" fmla="*/ 263236 w 346363"/>
+              <a:gd name="connsiteY1" fmla="*/ 124691 h 526473"/>
+              <a:gd name="connsiteX2" fmla="*/ 346363 w 346363"/>
+              <a:gd name="connsiteY2" fmla="*/ 526473 h 526473"/>
+            </a:gdLst>
+            <a:ahLst/>
+            <a:cxnLst>
+              <a:cxn ang="0">
+                <a:pos x="connsiteX0" y="connsiteY0"/>
+              </a:cxn>
+              <a:cxn ang="0">
+                <a:pos x="connsiteX1" y="connsiteY1"/>
+              </a:cxn>
+              <a:cxn ang="0">
+                <a:pos x="connsiteX2" y="connsiteY2"/>
+              </a:cxn>
+            </a:cxnLst>
+            <a:rect l="l" t="t" r="r" b="b"/>
+            <a:pathLst>
+              <a:path w="346363" h="526473">
+                <a:moveTo>
+                  <a:pt x="0" y="0"/>
+                </a:moveTo>
+                <a:cubicBezTo>
+                  <a:pt x="102754" y="18473"/>
+                  <a:pt x="205509" y="36946"/>
+                  <a:pt x="263236" y="124691"/>
+                </a:cubicBezTo>
+                <a:cubicBezTo>
+                  <a:pt x="320963" y="212436"/>
+                  <a:pt x="333663" y="369454"/>
+                  <a:pt x="346363" y="526473"/>
+                </a:cubicBezTo>
+              </a:path>
+            </a:pathLst>
+          </a:custGeom>
+          <a:noFill/>
+          <a:ln w="57150">
+            <a:solidFill>
+              <a:srgbClr val="0096FF"/>
+            </a:solidFill>
+            <a:tailEnd type="stealth"/>
+          </a:ln>
+        </p:spPr>
+        <p:style>
+          <a:lnRef idx="2">
+            <a:schemeClr val="accent1">
+              <a:shade val="15000"/>
+            </a:schemeClr>
+          </a:lnRef>
+          <a:fillRef idx="1">
+            <a:schemeClr val="accent1"/>
+          </a:fillRef>
+          <a:effectRef idx="0">
+            <a:schemeClr val="accent1"/>
+          </a:effectRef>
+          <a:fontRef idx="minor">
+            <a:schemeClr val="lt1"/>
+          </a:fontRef>
+        </p:style>
+        <p:txBody>
+          <a:bodyPr rtlCol="0" anchor="ctr"/>
+          <a:lstStyle/>
+          <a:p>
+            <a:pPr algn="ctr"/>
+            <a:endParaRPr lang="en-US"/>
+          </a:p>
+        </p:txBody>
+      </p:sp>
+      <p:sp>
+        <p:nvSpPr>
+          <p:cNvPr id="28" name="Freeform 27">
+            <a:extLst>
+              <a:ext uri="{FF2B5EF4-FFF2-40B4-BE49-F238E27FC236}">
+                <a16:creationId xmlns:a16="http://schemas.microsoft.com/office/drawing/2014/main" id="{BBF4F4EC-F7BE-0BA1-D6D7-05E0C5ACE277}"/>
+              </a:ext>
+            </a:extLst>
+          </p:cNvPr>
+          <p:cNvSpPr/>
+          <p:nvPr/>
+        </p:nvSpPr>
+        <p:spPr>
+          <a:xfrm>
+            <a:off x="692689" y="1256422"/>
+            <a:ext cx="356089" cy="526473"/>
+          </a:xfrm>
+          <a:custGeom>
+            <a:avLst/>
+            <a:gdLst>
+              <a:gd name="connsiteX0" fmla="*/ 0 w 346363"/>
+              <a:gd name="connsiteY0" fmla="*/ 0 h 526473"/>
+              <a:gd name="connsiteX1" fmla="*/ 263236 w 346363"/>
+              <a:gd name="connsiteY1" fmla="*/ 124691 h 526473"/>
+              <a:gd name="connsiteX2" fmla="*/ 346363 w 346363"/>
+              <a:gd name="connsiteY2" fmla="*/ 526473 h 526473"/>
+              <a:gd name="connsiteX0" fmla="*/ 0 w 346363"/>
+              <a:gd name="connsiteY0" fmla="*/ 0 h 526473"/>
+              <a:gd name="connsiteX1" fmla="*/ 37811 w 346363"/>
+              <a:gd name="connsiteY1" fmla="*/ 346941 h 526473"/>
+              <a:gd name="connsiteX2" fmla="*/ 346363 w 346363"/>
+              <a:gd name="connsiteY2" fmla="*/ 526473 h 526473"/>
+              <a:gd name="connsiteX0" fmla="*/ 0 w 346363"/>
+              <a:gd name="connsiteY0" fmla="*/ 0 h 526473"/>
+              <a:gd name="connsiteX1" fmla="*/ 37811 w 346363"/>
+              <a:gd name="connsiteY1" fmla="*/ 346941 h 526473"/>
+              <a:gd name="connsiteX2" fmla="*/ 346363 w 346363"/>
+              <a:gd name="connsiteY2" fmla="*/ 526473 h 526473"/>
+              <a:gd name="connsiteX0" fmla="*/ 9726 w 356089"/>
+              <a:gd name="connsiteY0" fmla="*/ 0 h 526473"/>
+              <a:gd name="connsiteX1" fmla="*/ 47537 w 356089"/>
+              <a:gd name="connsiteY1" fmla="*/ 346941 h 526473"/>
+              <a:gd name="connsiteX2" fmla="*/ 356089 w 356089"/>
+              <a:gd name="connsiteY2" fmla="*/ 526473 h 526473"/>
+            </a:gdLst>
+            <a:ahLst/>
+            <a:cxnLst>
+              <a:cxn ang="0">
+                <a:pos x="connsiteX0" y="connsiteY0"/>
+              </a:cxn>
+              <a:cxn ang="0">
+                <a:pos x="connsiteX1" y="connsiteY1"/>
+              </a:cxn>
+              <a:cxn ang="0">
+                <a:pos x="connsiteX2" y="connsiteY2"/>
+              </a:cxn>
+            </a:cxnLst>
+            <a:rect l="l" t="t" r="r" b="b"/>
+            <a:pathLst>
+              <a:path w="356089" h="526473">
+                <a:moveTo>
+                  <a:pt x="9726" y="0"/>
+                </a:moveTo>
+                <a:cubicBezTo>
+                  <a:pt x="-4995" y="199448"/>
+                  <a:pt x="-10190" y="259196"/>
+                  <a:pt x="47537" y="346941"/>
+                </a:cubicBezTo>
+                <a:cubicBezTo>
+                  <a:pt x="105264" y="434686"/>
+                  <a:pt x="254489" y="496454"/>
+                  <a:pt x="356089" y="526473"/>
+                </a:cubicBezTo>
+              </a:path>
+            </a:pathLst>
+          </a:custGeom>
+          <a:noFill/>
+          <a:ln w="57150">
+            <a:solidFill>
+              <a:srgbClr val="0096FF"/>
+            </a:solidFill>
+            <a:tailEnd type="stealth"/>
+          </a:ln>
+        </p:spPr>
+        <p:style>
+          <a:lnRef idx="2">
+            <a:schemeClr val="accent1">
+              <a:shade val="15000"/>
+            </a:schemeClr>
+          </a:lnRef>
+          <a:fillRef idx="1">
+            <a:schemeClr val="accent1"/>
+          </a:fillRef>
+          <a:effectRef idx="0">
+            <a:schemeClr val="accent1"/>
+          </a:effectRef>
+          <a:fontRef idx="minor">
+            <a:schemeClr val="lt1"/>
+          </a:fontRef>
+        </p:style>
+        <p:txBody>
+          <a:bodyPr rtlCol="0" anchor="ctr"/>
+          <a:lstStyle/>
+          <a:p>
+            <a:pPr algn="ctr"/>
+            <a:endParaRPr lang="en-US"/>
+          </a:p>
+        </p:txBody>
+      </p:sp>
+      <p:sp>
+        <p:nvSpPr>
+          <p:cNvPr id="29" name="Rounded Rectangle 28">
+            <a:extLst>
+              <a:ext uri="{FF2B5EF4-FFF2-40B4-BE49-F238E27FC236}">
+                <a16:creationId xmlns:a16="http://schemas.microsoft.com/office/drawing/2014/main" id="{53230580-48B5-4D3A-A095-1977A154626B}"/>
+              </a:ext>
+            </a:extLst>
+          </p:cNvPr>
+          <p:cNvSpPr/>
+          <p:nvPr/>
+        </p:nvSpPr>
+        <p:spPr>
+          <a:xfrm>
+            <a:off x="1372943" y="5416218"/>
+            <a:ext cx="1223373" cy="274134"/>
+          </a:xfrm>
+          <a:prstGeom prst="roundRect">
+            <a:avLst/>
+          </a:prstGeom>
+          <a:solidFill>
+            <a:schemeClr val="bg1">
+              <a:lumMod val="85000"/>
+            </a:schemeClr>
+          </a:solidFill>
+          <a:effectLst>
+            <a:outerShdw blurRad="50800" dist="38100" dir="2700000" algn="tl" rotWithShape="0">
+              <a:schemeClr val="tx1">
+                <a:alpha val="40000"/>
+              </a:schemeClr>
+            </a:outerShdw>
+          </a:effectLst>
+        </p:spPr>
+        <p:style>
+          <a:lnRef idx="2">
+            <a:schemeClr val="accent1">
+              <a:shade val="15000"/>
+            </a:schemeClr>
+          </a:lnRef>
+          <a:fillRef idx="1">
+            <a:schemeClr val="accent1"/>
+          </a:fillRef>
+          <a:effectRef idx="0">
+            <a:schemeClr val="accent1"/>
+          </a:effectRef>
+          <a:fontRef idx="minor">
+            <a:schemeClr val="lt1"/>
+          </a:fontRef>
+        </p:style>
+        <p:txBody>
+          <a:bodyPr rtlCol="0" anchor="ctr"/>
+          <a:lstStyle/>
+          <a:p>
+            <a:pPr algn="ctr"/>
+            <a:r>
+              <a:rPr lang="en-US" dirty="0">
+                <a:solidFill>
+                  <a:schemeClr val="tx1"/>
+                </a:solidFill>
+              </a:rPr>
+              <a:t>Start/Stop</a:t>
+            </a:r>
+          </a:p>
+        </p:txBody>
+      </p:sp>
+      <p:sp>
+        <p:nvSpPr>
+          <p:cNvPr id="30" name="Rounded Rectangle 29">
+            <a:extLst>
+              <a:ext uri="{FF2B5EF4-FFF2-40B4-BE49-F238E27FC236}">
+                <a16:creationId xmlns:a16="http://schemas.microsoft.com/office/drawing/2014/main" id="{5FB8F8F7-696D-D2C2-3DD1-4378B216CC29}"/>
+              </a:ext>
+            </a:extLst>
+          </p:cNvPr>
+          <p:cNvSpPr/>
+          <p:nvPr/>
+        </p:nvSpPr>
+        <p:spPr>
+          <a:xfrm>
+            <a:off x="2773416" y="5416218"/>
+            <a:ext cx="855140" cy="274134"/>
+          </a:xfrm>
+          <a:prstGeom prst="roundRect">
+            <a:avLst/>
+          </a:prstGeom>
+          <a:solidFill>
+            <a:schemeClr val="bg1">
+              <a:lumMod val="85000"/>
+            </a:schemeClr>
+          </a:solidFill>
+          <a:effectLst>
+            <a:outerShdw blurRad="50800" dist="38100" dir="2700000" algn="tl" rotWithShape="0">
+              <a:schemeClr val="tx1">
+                <a:alpha val="40000"/>
+              </a:schemeClr>
+            </a:outerShdw>
+          </a:effectLst>
+        </p:spPr>
+        <p:style>
+          <a:lnRef idx="2">
+            <a:schemeClr val="accent1">
+              <a:shade val="15000"/>
+            </a:schemeClr>
+          </a:lnRef>
+          <a:fillRef idx="1">
+            <a:schemeClr val="accent1"/>
+          </a:fillRef>
+          <a:effectRef idx="0">
+            <a:schemeClr val="accent1"/>
+          </a:effectRef>
+          <a:fontRef idx="minor">
+            <a:schemeClr val="lt1"/>
+          </a:fontRef>
+        </p:style>
+        <p:txBody>
+          <a:bodyPr rtlCol="0" anchor="ctr"/>
+          <a:lstStyle/>
+          <a:p>
+            <a:pPr algn="ctr"/>
+            <a:r>
+              <a:rPr lang="en-US" dirty="0">
+                <a:solidFill>
+                  <a:schemeClr val="tx1"/>
+                </a:solidFill>
+              </a:rPr>
+              <a:t>Reset</a:t>
+            </a:r>
+          </a:p>
+        </p:txBody>
+      </p:sp>
+      <p:sp>
+        <p:nvSpPr>
+          <p:cNvPr id="31" name="TextBox 30">
+            <a:extLst>
+              <a:ext uri="{FF2B5EF4-FFF2-40B4-BE49-F238E27FC236}">
+                <a16:creationId xmlns:a16="http://schemas.microsoft.com/office/drawing/2014/main" id="{C0C45A6D-D5BE-14B8-C5B9-F5D009651679}"/>
+              </a:ext>
+            </a:extLst>
+          </p:cNvPr>
+          <p:cNvSpPr txBox="1"/>
+          <p:nvPr/>
+        </p:nvSpPr>
+        <p:spPr>
+          <a:xfrm>
+            <a:off x="5810970" y="5388471"/>
+            <a:ext cx="1860509" cy="369332"/>
+          </a:xfrm>
+          <a:prstGeom prst="rect">
+            <a:avLst/>
+          </a:prstGeom>
+          <a:noFill/>
+        </p:spPr>
+        <p:txBody>
+          <a:bodyPr wrap="none" rtlCol="0">
+            <a:spAutoFit/>
+          </a:bodyPr>
+          <a:lstStyle/>
+          <a:p>
+            <a:r>
+              <a:rPr lang="en-US" dirty="0"/>
+              <a:t>Source Flow Rate:</a:t>
+            </a:r>
+          </a:p>
+        </p:txBody>
+      </p:sp>
+      <p:sp>
+        <p:nvSpPr>
+          <p:cNvPr id="32" name="TextBox 31">
+            <a:extLst>
+              <a:ext uri="{FF2B5EF4-FFF2-40B4-BE49-F238E27FC236}">
+                <a16:creationId xmlns:a16="http://schemas.microsoft.com/office/drawing/2014/main" id="{1276C9E0-6DF9-057B-3B2B-A5D366CF0E84}"/>
+              </a:ext>
+            </a:extLst>
+          </p:cNvPr>
+          <p:cNvSpPr txBox="1"/>
+          <p:nvPr/>
+        </p:nvSpPr>
+        <p:spPr>
+          <a:xfrm>
+            <a:off x="5946968" y="5690352"/>
+            <a:ext cx="1724511" cy="369332"/>
+          </a:xfrm>
+          <a:prstGeom prst="rect">
+            <a:avLst/>
+          </a:prstGeom>
+          <a:noFill/>
+        </p:spPr>
+        <p:txBody>
+          <a:bodyPr wrap="none" rtlCol="0">
+            <a:spAutoFit/>
+          </a:bodyPr>
+          <a:lstStyle/>
+          <a:p>
+            <a:r>
+              <a:rPr lang="en-US" dirty="0"/>
+              <a:t>Drain Flow Rate:</a:t>
+            </a:r>
+          </a:p>
+        </p:txBody>
+      </p:sp>
+      <p:sp>
+        <p:nvSpPr>
+          <p:cNvPr id="33" name="Rectangle 32">
+            <a:extLst>
+              <a:ext uri="{FF2B5EF4-FFF2-40B4-BE49-F238E27FC236}">
+                <a16:creationId xmlns:a16="http://schemas.microsoft.com/office/drawing/2014/main" id="{44C311BC-73BF-5C5A-C8AB-55DFA873F0FB}"/>
+              </a:ext>
+            </a:extLst>
+          </p:cNvPr>
+          <p:cNvSpPr/>
+          <p:nvPr/>
+        </p:nvSpPr>
+        <p:spPr>
+          <a:xfrm>
+            <a:off x="7841673" y="5497829"/>
+            <a:ext cx="1454727" cy="167348"/>
+          </a:xfrm>
+          <a:prstGeom prst="rect">
+            <a:avLst/>
+          </a:prstGeom>
+          <a:solidFill>
+            <a:srgbClr val="0432FF"/>
+          </a:solidFill>
+        </p:spPr>
+        <p:style>
+          <a:lnRef idx="2">
+            <a:schemeClr val="accent1">
+              <a:shade val="15000"/>
+            </a:schemeClr>
+          </a:lnRef>
+          <a:fillRef idx="1">
+            <a:schemeClr val="accent1"/>
+          </a:fillRef>
+          <a:effectRef idx="0">
+            <a:schemeClr val="accent1"/>
+          </a:effectRef>
+          <a:fontRef idx="minor">
+            <a:schemeClr val="lt1"/>
+          </a:fontRef>
+        </p:style>
+        <p:txBody>
+          <a:bodyPr rtlCol="0" anchor="ctr"/>
+          <a:lstStyle/>
+          <a:p>
+            <a:pPr algn="ctr"/>
+            <a:endParaRPr lang="en-US"/>
+          </a:p>
+        </p:txBody>
+      </p:sp>
+      <p:sp>
+        <p:nvSpPr>
+          <p:cNvPr id="34" name="Rectangle 33">
+            <a:extLst>
+              <a:ext uri="{FF2B5EF4-FFF2-40B4-BE49-F238E27FC236}">
+                <a16:creationId xmlns:a16="http://schemas.microsoft.com/office/drawing/2014/main" id="{118C4287-EE93-EF9F-3EB9-FB69CDE6C5D5}"/>
+              </a:ext>
+            </a:extLst>
+          </p:cNvPr>
+          <p:cNvSpPr/>
+          <p:nvPr/>
+        </p:nvSpPr>
+        <p:spPr>
+          <a:xfrm>
+            <a:off x="7841673" y="5791344"/>
+            <a:ext cx="1454727" cy="167348"/>
+          </a:xfrm>
+          <a:prstGeom prst="rect">
+            <a:avLst/>
+          </a:prstGeom>
+          <a:solidFill>
+            <a:srgbClr val="0432FF"/>
+          </a:solidFill>
+        </p:spPr>
+        <p:style>
+          <a:lnRef idx="2">
+            <a:schemeClr val="accent1">
+              <a:shade val="15000"/>
+            </a:schemeClr>
+          </a:lnRef>
+          <a:fillRef idx="1">
+            <a:schemeClr val="accent1"/>
+          </a:fillRef>
+          <a:effectRef idx="0">
+            <a:schemeClr val="accent1"/>
+          </a:effectRef>
+          <a:fontRef idx="minor">
+            <a:schemeClr val="lt1"/>
+          </a:fontRef>
+        </p:style>
+        <p:txBody>
+          <a:bodyPr rtlCol="0" anchor="ctr"/>
+          <a:lstStyle/>
+          <a:p>
+            <a:pPr algn="ctr"/>
+            <a:endParaRPr lang="en-US"/>
+          </a:p>
+        </p:txBody>
+      </p:sp>
+      <p:sp>
+        <p:nvSpPr>
+          <p:cNvPr id="35" name="Oval 34">
+            <a:extLst>
+              <a:ext uri="{FF2B5EF4-FFF2-40B4-BE49-F238E27FC236}">
+                <a16:creationId xmlns:a16="http://schemas.microsoft.com/office/drawing/2014/main" id="{5E998C41-F33F-7515-F743-1127B70353E0}"/>
+              </a:ext>
+            </a:extLst>
+          </p:cNvPr>
+          <p:cNvSpPr/>
+          <p:nvPr/>
+        </p:nvSpPr>
+        <p:spPr>
+          <a:xfrm>
+            <a:off x="8374561" y="5444398"/>
+            <a:ext cx="336360" cy="274134"/>
+          </a:xfrm>
+          <a:prstGeom prst="ellipse">
+            <a:avLst/>
+          </a:prstGeom>
+          <a:solidFill>
+            <a:schemeClr val="bg1">
+              <a:lumMod val="50000"/>
+            </a:schemeClr>
+          </a:solidFill>
+        </p:spPr>
+        <p:style>
+          <a:lnRef idx="2">
+            <a:schemeClr val="accent1">
+              <a:shade val="15000"/>
+            </a:schemeClr>
+          </a:lnRef>
+          <a:fillRef idx="1">
+            <a:schemeClr val="accent1"/>
+          </a:fillRef>
+          <a:effectRef idx="0">
+            <a:schemeClr val="accent1"/>
+          </a:effectRef>
+          <a:fontRef idx="minor">
+            <a:schemeClr val="lt1"/>
+          </a:fontRef>
+        </p:style>
+        <p:txBody>
+          <a:bodyPr rtlCol="0" anchor="ctr"/>
+          <a:lstStyle/>
+          <a:p>
+            <a:pPr algn="ctr"/>
+            <a:endParaRPr lang="en-US"/>
+          </a:p>
+        </p:txBody>
+      </p:sp>
+      <p:sp>
+        <p:nvSpPr>
+          <p:cNvPr id="36" name="Oval 35">
+            <a:extLst>
+              <a:ext uri="{FF2B5EF4-FFF2-40B4-BE49-F238E27FC236}">
+                <a16:creationId xmlns:a16="http://schemas.microsoft.com/office/drawing/2014/main" id="{43C3BE4F-058E-1379-7F2C-C81D993EBDC1}"/>
+              </a:ext>
+            </a:extLst>
+          </p:cNvPr>
+          <p:cNvSpPr/>
+          <p:nvPr/>
+        </p:nvSpPr>
+        <p:spPr>
+          <a:xfrm>
+            <a:off x="8384828" y="5757803"/>
+            <a:ext cx="336360" cy="274134"/>
+          </a:xfrm>
+          <a:prstGeom prst="ellipse">
+            <a:avLst/>
+          </a:prstGeom>
+          <a:solidFill>
+            <a:schemeClr val="bg1">
+              <a:lumMod val="50000"/>
+            </a:schemeClr>
+          </a:solidFill>
+        </p:spPr>
+        <p:style>
+          <a:lnRef idx="2">
+            <a:schemeClr val="accent1">
+              <a:shade val="15000"/>
+            </a:schemeClr>
+          </a:lnRef>
+          <a:fillRef idx="1">
+            <a:schemeClr val="accent1"/>
+          </a:fillRef>
+          <a:effectRef idx="0">
+            <a:schemeClr val="accent1"/>
+          </a:effectRef>
+          <a:fontRef idx="minor">
+            <a:schemeClr val="lt1"/>
+          </a:fontRef>
+        </p:style>
+        <p:txBody>
+          <a:bodyPr rtlCol="0" anchor="ctr"/>
+          <a:lstStyle/>
+          <a:p>
+            <a:pPr algn="ctr"/>
+            <a:endParaRPr lang="en-US"/>
+          </a:p>
+        </p:txBody>
+      </p:sp>
     </p:spTree>
     <p:extLst>
       <p:ext uri="{BB962C8B-B14F-4D97-AF65-F5344CB8AC3E}">
         <p14:creationId xmlns:p14="http://schemas.microsoft.com/office/powerpoint/2010/main" val="3048217830"/>
+      </p:ext>
+    </p:extLst>
+  </p:cSld>
+  <p:clrMapOvr>
+    <a:masterClrMapping/>
+  </p:clrMapOvr>
+</p:sld>
+</file>
+
+<file path=ppt/slides/slide3.xml><?xml version="1.0" encoding="utf-8"?>
+<p:sld xmlns:a="http://schemas.openxmlformats.org/drawingml/2006/main" xmlns:r="http://schemas.openxmlformats.org/officeDocument/2006/relationships" xmlns:p="http://schemas.openxmlformats.org/presentationml/2006/main">
+  <p:cSld>
+    <p:spTree>
+      <p:nvGrpSpPr>
+        <p:cNvPr id="1" name=""/>
+        <p:cNvGrpSpPr/>
+        <p:nvPr/>
+      </p:nvGrpSpPr>
+      <p:grpSpPr>
+        <a:xfrm>
+          <a:off x="0" y="0"/>
+          <a:ext cx="0" cy="0"/>
+          <a:chOff x="0" y="0"/>
+          <a:chExt cx="0" cy="0"/>
+        </a:xfrm>
+      </p:grpSpPr>
+      <p:sp>
+        <p:nvSpPr>
+          <p:cNvPr id="2" name="Title 1">
+            <a:extLst>
+              <a:ext uri="{FF2B5EF4-FFF2-40B4-BE49-F238E27FC236}">
+                <a16:creationId xmlns:a16="http://schemas.microsoft.com/office/drawing/2014/main" id="{9AEE8728-C779-EF75-32A1-5635F90BFFDA}"/>
+              </a:ext>
+            </a:extLst>
+          </p:cNvPr>
+          <p:cNvSpPr>
+            <a:spLocks noGrp="1"/>
+          </p:cNvSpPr>
+          <p:nvPr>
+            <p:ph type="title"/>
+          </p:nvPr>
+        </p:nvSpPr>
+        <p:spPr/>
+        <p:txBody>
+          <a:bodyPr/>
+          <a:lstStyle/>
+          <a:p>
+            <a:r>
+              <a:rPr lang="en-US" dirty="0"/>
+              <a:t>Text</a:t>
+            </a:r>
+          </a:p>
+        </p:txBody>
+      </p:sp>
+      <p:sp>
+        <p:nvSpPr>
+          <p:cNvPr id="3" name="Content Placeholder 2">
+            <a:extLst>
+              <a:ext uri="{FF2B5EF4-FFF2-40B4-BE49-F238E27FC236}">
+                <a16:creationId xmlns:a16="http://schemas.microsoft.com/office/drawing/2014/main" id="{FD5EBB6B-D190-1274-EF8F-34F429881B08}"/>
+              </a:ext>
+            </a:extLst>
+          </p:cNvPr>
+          <p:cNvSpPr>
+            <a:spLocks noGrp="1"/>
+          </p:cNvSpPr>
+          <p:nvPr>
+            <p:ph idx="1"/>
+          </p:nvPr>
+        </p:nvSpPr>
+        <p:spPr/>
+        <p:txBody>
+          <a:bodyPr/>
+          <a:lstStyle/>
+          <a:p>
+            <a:r>
+              <a:rPr lang="en-US" dirty="0"/>
+              <a:t>Create a simulation of a bathtub with a source and drain</a:t>
+            </a:r>
+          </a:p>
+          <a:p>
+            <a:r>
+              <a:rPr lang="en-US" dirty="0"/>
+              <a:t>On the left is an image of the bathtub with the water height shown</a:t>
+            </a:r>
+          </a:p>
+          <a:p>
+            <a:r>
+              <a:rPr lang="en-US" dirty="0"/>
+              <a:t>On the right is a chart that displays water height vs. time</a:t>
+            </a:r>
+          </a:p>
+          <a:p>
+            <a:r>
+              <a:rPr lang="en-US" dirty="0"/>
+              <a:t>Add sliders for the source and drain flow rates</a:t>
+            </a:r>
+          </a:p>
+          <a:p>
+            <a:r>
+              <a:rPr lang="en-US" dirty="0"/>
+              <a:t>Make the source initial value be 0 liters/minute</a:t>
+            </a:r>
+          </a:p>
+          <a:p>
+            <a:r>
+              <a:rPr lang="en-US" dirty="0"/>
+              <a:t>Make the drain be 1 liter per minute</a:t>
+            </a:r>
+          </a:p>
+          <a:p>
+            <a:r>
+              <a:rPr lang="en-US" dirty="0"/>
+              <a:t>Add buttons to start/stop and reset the simulation</a:t>
+            </a:r>
+          </a:p>
+        </p:txBody>
+      </p:sp>
+    </p:spTree>
+    <p:extLst>
+      <p:ext uri="{BB962C8B-B14F-4D97-AF65-F5344CB8AC3E}">
+        <p14:creationId xmlns:p14="http://schemas.microsoft.com/office/powerpoint/2010/main" val="506447710"/>
+      </p:ext>
+    </p:extLst>
+  </p:cSld>
+  <p:clrMapOvr>
+    <a:masterClrMapping/>
+  </p:clrMapOvr>
+</p:sld>
+</file>
+
+<file path=ppt/slides/slide4.xml><?xml version="1.0" encoding="utf-8"?>
+<p:sld xmlns:a="http://schemas.openxmlformats.org/drawingml/2006/main" xmlns:r="http://schemas.openxmlformats.org/officeDocument/2006/relationships" xmlns:p="http://schemas.openxmlformats.org/presentationml/2006/main">
+  <p:cSld>
+    <p:spTree>
+      <p:nvGrpSpPr>
+        <p:cNvPr id="1" name=""/>
+        <p:cNvGrpSpPr/>
+        <p:nvPr/>
+      </p:nvGrpSpPr>
+      <p:grpSpPr>
+        <a:xfrm>
+          <a:off x="0" y="0"/>
+          <a:ext cx="0" cy="0"/>
+          <a:chOff x="0" y="0"/>
+          <a:chExt cx="0" cy="0"/>
+        </a:xfrm>
+      </p:grpSpPr>
+      <p:sp>
+        <p:nvSpPr>
+          <p:cNvPr id="2" name="Title 1">
+            <a:extLst>
+              <a:ext uri="{FF2B5EF4-FFF2-40B4-BE49-F238E27FC236}">
+                <a16:creationId xmlns:a16="http://schemas.microsoft.com/office/drawing/2014/main" id="{12E00462-1EAD-BB73-F602-470ACB65F702}"/>
+              </a:ext>
+            </a:extLst>
+          </p:cNvPr>
+          <p:cNvSpPr>
+            <a:spLocks noGrp="1"/>
+          </p:cNvSpPr>
+          <p:nvPr>
+            <p:ph type="title"/>
+          </p:nvPr>
+        </p:nvSpPr>
+        <p:spPr/>
+        <p:txBody>
+          <a:bodyPr/>
+          <a:lstStyle/>
+          <a:p>
+            <a:r>
+              <a:rPr lang="en-US" dirty="0"/>
+              <a:t>Pressure at the Bottom of the Tank</a:t>
+            </a:r>
+          </a:p>
+        </p:txBody>
+      </p:sp>
+      <p:sp>
+        <p:nvSpPr>
+          <p:cNvPr id="3" name="Content Placeholder 2">
+            <a:extLst>
+              <a:ext uri="{FF2B5EF4-FFF2-40B4-BE49-F238E27FC236}">
+                <a16:creationId xmlns:a16="http://schemas.microsoft.com/office/drawing/2014/main" id="{F0BE8778-47E4-A155-BC92-0440D86A7EDD}"/>
+              </a:ext>
+            </a:extLst>
+          </p:cNvPr>
+          <p:cNvSpPr>
+            <a:spLocks noGrp="1"/>
+          </p:cNvSpPr>
+          <p:nvPr>
+            <p:ph idx="1"/>
+          </p:nvPr>
+        </p:nvSpPr>
+        <p:spPr/>
+        <p:txBody>
+          <a:bodyPr>
+            <a:normAutofit fontScale="62500" lnSpcReduction="20000"/>
+          </a:bodyPr>
+          <a:lstStyle/>
+          <a:p>
+            <a:pPr marL="0" indent="0" algn="l">
+              <a:buNone/>
+            </a:pPr>
+            <a:r>
+              <a:rPr lang="en-US" b="1" i="0" dirty="0">
+                <a:solidFill>
+                  <a:srgbClr val="374151"/>
+                </a:solidFill>
+                <a:effectLst/>
+                <a:latin typeface="Söhne"/>
+              </a:rPr>
+              <a:t>Prompt</a:t>
+            </a:r>
+            <a:r>
+              <a:rPr lang="en-US" b="0" i="0" dirty="0">
+                <a:solidFill>
+                  <a:srgbClr val="374151"/>
+                </a:solidFill>
+                <a:effectLst/>
+                <a:latin typeface="Söhne"/>
+              </a:rPr>
+              <a:t>:</a:t>
+            </a:r>
+          </a:p>
+          <a:p>
+            <a:pPr marL="0" indent="0" algn="l">
+              <a:buNone/>
+            </a:pPr>
+            <a:r>
+              <a:rPr lang="en-US" b="0" i="1" dirty="0">
+                <a:solidFill>
+                  <a:srgbClr val="0F0F0F"/>
+                </a:solidFill>
+                <a:effectLst/>
+                <a:latin typeface="Söhne"/>
+              </a:rPr>
+              <a:t>Assume we have water in a cylinder tank container of height H and diameter W. Write a formula that expresses the pressure at the bottom of the cylinder as a function of the depth of the water D.</a:t>
+            </a:r>
+            <a:endParaRPr lang="en-US" b="0" i="1" dirty="0">
+              <a:solidFill>
+                <a:srgbClr val="374151"/>
+              </a:solidFill>
+              <a:effectLst/>
+              <a:latin typeface="Söhne"/>
+            </a:endParaRPr>
+          </a:p>
+          <a:p>
+            <a:pPr marL="0" indent="0" algn="l">
+              <a:buNone/>
+            </a:pPr>
+            <a:br>
+              <a:rPr lang="en-US" b="0" i="0" dirty="0">
+                <a:solidFill>
+                  <a:srgbClr val="374151"/>
+                </a:solidFill>
+                <a:effectLst/>
+                <a:latin typeface="Söhne"/>
+              </a:rPr>
+            </a:br>
+            <a:r>
+              <a:rPr lang="en-US" b="0" i="0" dirty="0">
+                <a:solidFill>
+                  <a:srgbClr val="374151"/>
+                </a:solidFill>
+                <a:effectLst/>
+                <a:latin typeface="Söhne"/>
+              </a:rPr>
+              <a:t>The pressure at the bottom of a cylindrical tank containing water depends on the depth of the water, rather than the height of the tank or its diameter. This pressure can be calculated using the formula:</a:t>
+            </a:r>
+          </a:p>
+          <a:p>
+            <a:pPr marL="0" indent="0" algn="l">
+              <a:buNone/>
+            </a:pPr>
+            <a:r>
+              <a:rPr lang="en-US" b="0" i="0" dirty="0">
+                <a:solidFill>
+                  <a:srgbClr val="374151"/>
+                </a:solidFill>
+                <a:effectLst/>
+                <a:latin typeface="KaTeX_Main"/>
+              </a:rPr>
+              <a:t>�=�×�×�</a:t>
+            </a:r>
+            <a:r>
+              <a:rPr lang="en-US" b="0" i="1" dirty="0">
+                <a:solidFill>
+                  <a:srgbClr val="374151"/>
+                </a:solidFill>
+                <a:effectLst/>
+                <a:latin typeface="KaTeX_Math"/>
+              </a:rPr>
+              <a:t>P</a:t>
+            </a:r>
+            <a:r>
+              <a:rPr lang="en-US" b="0" i="0" dirty="0">
+                <a:solidFill>
+                  <a:srgbClr val="374151"/>
+                </a:solidFill>
+                <a:effectLst/>
+                <a:latin typeface="KaTeX_Main"/>
+              </a:rPr>
+              <a:t>=</a:t>
+            </a:r>
+            <a:r>
+              <a:rPr lang="el-GR" b="0" i="1" dirty="0">
+                <a:solidFill>
+                  <a:srgbClr val="374151"/>
+                </a:solidFill>
+                <a:effectLst/>
+                <a:latin typeface="KaTeX_Math"/>
+              </a:rPr>
+              <a:t>ρ</a:t>
+            </a:r>
+            <a:r>
+              <a:rPr lang="el-GR" b="0" i="0" dirty="0">
+                <a:solidFill>
+                  <a:srgbClr val="374151"/>
+                </a:solidFill>
+                <a:effectLst/>
+                <a:latin typeface="KaTeX_Main"/>
+              </a:rPr>
+              <a:t>×</a:t>
+            </a:r>
+            <a:r>
+              <a:rPr lang="en-US" b="0" i="1" dirty="0" err="1">
+                <a:solidFill>
+                  <a:srgbClr val="374151"/>
+                </a:solidFill>
+                <a:effectLst/>
+                <a:latin typeface="KaTeX_Math"/>
+              </a:rPr>
+              <a:t>g</a:t>
+            </a:r>
+            <a:r>
+              <a:rPr lang="en-US" b="0" i="0" dirty="0" err="1">
+                <a:solidFill>
+                  <a:srgbClr val="374151"/>
+                </a:solidFill>
+                <a:effectLst/>
+                <a:latin typeface="KaTeX_Main"/>
+              </a:rPr>
+              <a:t>×</a:t>
+            </a:r>
+            <a:r>
+              <a:rPr lang="en-US" b="0" i="1" dirty="0" err="1">
+                <a:solidFill>
+                  <a:srgbClr val="374151"/>
+                </a:solidFill>
+                <a:effectLst/>
+                <a:latin typeface="KaTeX_Math"/>
+              </a:rPr>
+              <a:t>D</a:t>
+            </a:r>
+            <a:endParaRPr lang="en-US" b="0" i="0" dirty="0">
+              <a:solidFill>
+                <a:srgbClr val="374151"/>
+              </a:solidFill>
+              <a:effectLst/>
+              <a:latin typeface="Söhne"/>
+            </a:endParaRPr>
+          </a:p>
+          <a:p>
+            <a:pPr marL="0" indent="0" algn="l">
+              <a:buNone/>
+            </a:pPr>
+            <a:r>
+              <a:rPr lang="en-US" b="0" i="0" dirty="0">
+                <a:solidFill>
+                  <a:srgbClr val="374151"/>
+                </a:solidFill>
+                <a:effectLst/>
+                <a:latin typeface="Söhne"/>
+              </a:rPr>
+              <a:t>Where:</a:t>
+            </a:r>
+          </a:p>
+          <a:p>
+            <a:pPr marL="0" indent="0" algn="l">
+              <a:buNone/>
+            </a:pPr>
+            <a:r>
+              <a:rPr lang="en-US" b="0" i="0" dirty="0">
+                <a:solidFill>
+                  <a:srgbClr val="374151"/>
+                </a:solidFill>
+                <a:effectLst/>
+                <a:latin typeface="KaTeX_Main"/>
+              </a:rPr>
+              <a:t>�</a:t>
+            </a:r>
+            <a:r>
+              <a:rPr lang="en-US" b="0" i="1" dirty="0">
+                <a:solidFill>
+                  <a:srgbClr val="374151"/>
+                </a:solidFill>
+                <a:effectLst/>
+                <a:latin typeface="KaTeX_Math"/>
+              </a:rPr>
+              <a:t>P</a:t>
+            </a:r>
+            <a:r>
+              <a:rPr lang="en-US" b="0" i="0" dirty="0">
+                <a:solidFill>
+                  <a:srgbClr val="374151"/>
+                </a:solidFill>
+                <a:effectLst/>
+                <a:latin typeface="Söhne"/>
+              </a:rPr>
+              <a:t> is the pressure at the bottom of the tank.</a:t>
+            </a:r>
+          </a:p>
+          <a:p>
+            <a:pPr marL="0" indent="0" algn="l">
+              <a:buNone/>
+            </a:pPr>
+            <a:r>
+              <a:rPr lang="en-US" b="0" i="0" dirty="0">
+                <a:solidFill>
+                  <a:srgbClr val="374151"/>
+                </a:solidFill>
+                <a:effectLst/>
+                <a:latin typeface="KaTeX_Main"/>
+              </a:rPr>
+              <a:t>�</a:t>
+            </a:r>
+            <a:r>
+              <a:rPr lang="el-GR" b="0" i="1" dirty="0">
+                <a:solidFill>
+                  <a:srgbClr val="374151"/>
+                </a:solidFill>
+                <a:effectLst/>
+                <a:latin typeface="KaTeX_Math"/>
+              </a:rPr>
+              <a:t>ρ</a:t>
+            </a:r>
+            <a:r>
+              <a:rPr lang="el-GR" b="0" i="0" dirty="0">
+                <a:solidFill>
+                  <a:srgbClr val="374151"/>
+                </a:solidFill>
+                <a:effectLst/>
+                <a:latin typeface="Söhne"/>
+              </a:rPr>
+              <a:t> </a:t>
+            </a:r>
+            <a:r>
+              <a:rPr lang="en-US" b="0" i="0" dirty="0">
+                <a:solidFill>
+                  <a:srgbClr val="374151"/>
+                </a:solidFill>
+                <a:effectLst/>
+                <a:latin typeface="Söhne"/>
+              </a:rPr>
+              <a:t>is the density of the water (approximately </a:t>
+            </a:r>
+            <a:r>
+              <a:rPr lang="en-US" b="0" i="0" dirty="0">
+                <a:solidFill>
+                  <a:srgbClr val="374151"/>
+                </a:solidFill>
+                <a:effectLst/>
+                <a:latin typeface="KaTeX_Main"/>
+              </a:rPr>
+              <a:t>1000 kg/m31000kg/m3</a:t>
+            </a:r>
+            <a:r>
+              <a:rPr lang="en-US" b="0" i="0" dirty="0">
+                <a:solidFill>
+                  <a:srgbClr val="374151"/>
+                </a:solidFill>
+                <a:effectLst/>
+                <a:latin typeface="Söhne"/>
+              </a:rPr>
+              <a:t> for fresh water at room temperature).</a:t>
+            </a:r>
+          </a:p>
+          <a:p>
+            <a:pPr marL="0" indent="0" algn="l">
+              <a:buNone/>
+            </a:pPr>
+            <a:r>
+              <a:rPr lang="en-US" b="0" i="0" dirty="0">
+                <a:solidFill>
+                  <a:srgbClr val="374151"/>
+                </a:solidFill>
+                <a:effectLst/>
+                <a:latin typeface="KaTeX_Main"/>
+              </a:rPr>
+              <a:t>�</a:t>
+            </a:r>
+            <a:r>
+              <a:rPr lang="en-US" b="0" i="1" dirty="0">
+                <a:solidFill>
+                  <a:srgbClr val="374151"/>
+                </a:solidFill>
+                <a:effectLst/>
+                <a:latin typeface="KaTeX_Math"/>
+              </a:rPr>
+              <a:t>g</a:t>
+            </a:r>
+            <a:r>
+              <a:rPr lang="en-US" b="0" i="0" dirty="0">
+                <a:solidFill>
+                  <a:srgbClr val="374151"/>
+                </a:solidFill>
+                <a:effectLst/>
+                <a:latin typeface="Söhne"/>
+              </a:rPr>
+              <a:t> is the acceleration due to gravity (approximately </a:t>
+            </a:r>
+            <a:r>
+              <a:rPr lang="en-US" b="0" i="0" dirty="0">
+                <a:solidFill>
+                  <a:srgbClr val="374151"/>
+                </a:solidFill>
+                <a:effectLst/>
+                <a:latin typeface="KaTeX_Main"/>
+              </a:rPr>
+              <a:t>9.81 m/s29.81m/s2</a:t>
+            </a:r>
+            <a:r>
+              <a:rPr lang="en-US" b="0" i="0" dirty="0">
+                <a:solidFill>
+                  <a:srgbClr val="374151"/>
+                </a:solidFill>
+                <a:effectLst/>
+                <a:latin typeface="Söhne"/>
+              </a:rPr>
+              <a:t> on the surface of the Earth).</a:t>
+            </a:r>
+          </a:p>
+          <a:p>
+            <a:pPr marL="0" indent="0" algn="l">
+              <a:buNone/>
+            </a:pPr>
+            <a:r>
+              <a:rPr lang="en-US" b="0" i="0" dirty="0">
+                <a:solidFill>
+                  <a:srgbClr val="374151"/>
+                </a:solidFill>
+                <a:effectLst/>
+                <a:latin typeface="KaTeX_Main"/>
+              </a:rPr>
+              <a:t>�</a:t>
+            </a:r>
+            <a:r>
+              <a:rPr lang="en-US" b="0" i="1" dirty="0">
+                <a:solidFill>
+                  <a:srgbClr val="374151"/>
+                </a:solidFill>
+                <a:effectLst/>
+                <a:latin typeface="KaTeX_Math"/>
+              </a:rPr>
+              <a:t>D</a:t>
+            </a:r>
+            <a:r>
+              <a:rPr lang="en-US" b="0" i="0" dirty="0">
+                <a:solidFill>
+                  <a:srgbClr val="374151"/>
+                </a:solidFill>
+                <a:effectLst/>
+                <a:latin typeface="Söhne"/>
+              </a:rPr>
+              <a:t> is the depth of the water in the tank.</a:t>
+            </a:r>
+          </a:p>
+          <a:p>
+            <a:pPr marL="0" indent="0" algn="l">
+              <a:buNone/>
+            </a:pPr>
+            <a:r>
+              <a:rPr lang="en-US" b="1" i="0" dirty="0">
+                <a:solidFill>
+                  <a:srgbClr val="374151"/>
+                </a:solidFill>
+                <a:effectLst/>
+                <a:latin typeface="Söhne"/>
+              </a:rPr>
+              <a:t>So, the pressure increases linearly with the depth of the water. </a:t>
+            </a:r>
+            <a:r>
+              <a:rPr lang="en-US" b="0" i="0" dirty="0">
+                <a:solidFill>
+                  <a:srgbClr val="374151"/>
+                </a:solidFill>
+                <a:effectLst/>
+                <a:latin typeface="Söhne"/>
+              </a:rPr>
+              <a:t>The height of the tank and its diameter don't directly influence the pressure at the bottom, as long as the depth </a:t>
+            </a:r>
+            <a:r>
+              <a:rPr lang="en-US" b="0" i="0" dirty="0">
+                <a:solidFill>
+                  <a:srgbClr val="374151"/>
+                </a:solidFill>
+                <a:effectLst/>
+                <a:latin typeface="KaTeX_Main"/>
+              </a:rPr>
+              <a:t>�</a:t>
+            </a:r>
+            <a:r>
+              <a:rPr lang="en-US" b="0" i="1" dirty="0">
+                <a:solidFill>
+                  <a:srgbClr val="374151"/>
+                </a:solidFill>
+                <a:effectLst/>
+                <a:latin typeface="KaTeX_Math"/>
+              </a:rPr>
+              <a:t>D</a:t>
+            </a:r>
+            <a:r>
+              <a:rPr lang="en-US" b="0" i="0" dirty="0">
+                <a:solidFill>
+                  <a:srgbClr val="374151"/>
+                </a:solidFill>
+                <a:effectLst/>
+                <a:latin typeface="Söhne"/>
+              </a:rPr>
+              <a:t> of the water is considered.</a:t>
+            </a:r>
+          </a:p>
+          <a:p>
+            <a:pPr marL="0" indent="0">
+              <a:buNone/>
+            </a:pPr>
+            <a:endParaRPr lang="en-US" dirty="0"/>
+          </a:p>
+        </p:txBody>
+      </p:sp>
+    </p:spTree>
+    <p:extLst>
+      <p:ext uri="{BB962C8B-B14F-4D97-AF65-F5344CB8AC3E}">
+        <p14:creationId xmlns:p14="http://schemas.microsoft.com/office/powerpoint/2010/main" val="279319053"/>
+      </p:ext>
+    </p:extLst>
+  </p:cSld>
+  <p:clrMapOvr>
+    <a:masterClrMapping/>
+  </p:clrMapOvr>
+</p:sld>
+</file>
+
+<file path=ppt/slides/slide5.xml><?xml version="1.0" encoding="utf-8"?>
+<p:sld xmlns:a="http://schemas.openxmlformats.org/drawingml/2006/main" xmlns:r="http://schemas.openxmlformats.org/officeDocument/2006/relationships" xmlns:p="http://schemas.openxmlformats.org/presentationml/2006/main">
+  <p:cSld>
+    <p:spTree>
+      <p:nvGrpSpPr>
+        <p:cNvPr id="1" name=""/>
+        <p:cNvGrpSpPr/>
+        <p:nvPr/>
+      </p:nvGrpSpPr>
+      <p:grpSpPr>
+        <a:xfrm>
+          <a:off x="0" y="0"/>
+          <a:ext cx="0" cy="0"/>
+          <a:chOff x="0" y="0"/>
+          <a:chExt cx="0" cy="0"/>
+        </a:xfrm>
+      </p:grpSpPr>
+      <p:sp>
+        <p:nvSpPr>
+          <p:cNvPr id="2" name="Title 1">
+            <a:extLst>
+              <a:ext uri="{FF2B5EF4-FFF2-40B4-BE49-F238E27FC236}">
+                <a16:creationId xmlns:a16="http://schemas.microsoft.com/office/drawing/2014/main" id="{5A7A91B4-A5CA-0215-9D2A-48372014C9C5}"/>
+              </a:ext>
+            </a:extLst>
+          </p:cNvPr>
+          <p:cNvSpPr>
+            <a:spLocks noGrp="1"/>
+          </p:cNvSpPr>
+          <p:nvPr>
+            <p:ph type="title"/>
+          </p:nvPr>
+        </p:nvSpPr>
+        <p:spPr>
+          <a:xfrm>
+            <a:off x="838200" y="365126"/>
+            <a:ext cx="10515600" cy="505208"/>
+          </a:xfrm>
+        </p:spPr>
+        <p:txBody>
+          <a:bodyPr>
+            <a:normAutofit fontScale="90000"/>
+          </a:bodyPr>
+          <a:lstStyle/>
+          <a:p>
+            <a:r>
+              <a:rPr lang="en-US" dirty="0"/>
+              <a:t>Python Code</a:t>
+            </a:r>
+          </a:p>
+        </p:txBody>
+      </p:sp>
+      <p:sp>
+        <p:nvSpPr>
+          <p:cNvPr id="3" name="Content Placeholder 2">
+            <a:extLst>
+              <a:ext uri="{FF2B5EF4-FFF2-40B4-BE49-F238E27FC236}">
+                <a16:creationId xmlns:a16="http://schemas.microsoft.com/office/drawing/2014/main" id="{C3D53987-BF2E-4BDE-EC8A-8B3534C45725}"/>
+              </a:ext>
+            </a:extLst>
+          </p:cNvPr>
+          <p:cNvSpPr>
+            <a:spLocks noGrp="1"/>
+          </p:cNvSpPr>
+          <p:nvPr>
+            <p:ph idx="1"/>
+          </p:nvPr>
+        </p:nvSpPr>
+        <p:spPr>
+          <a:xfrm>
+            <a:off x="838200" y="1320417"/>
+            <a:ext cx="10515600" cy="4351338"/>
+          </a:xfrm>
+        </p:spPr>
+        <p:txBody>
+          <a:bodyPr>
+            <a:normAutofit fontScale="47500" lnSpcReduction="20000"/>
+          </a:bodyPr>
+          <a:lstStyle/>
+          <a:p>
+            <a:pPr marL="0" indent="0" algn="l">
+              <a:buNone/>
+            </a:pPr>
+            <a:r>
+              <a:rPr lang="en-US" b="0" i="0" dirty="0">
+                <a:solidFill>
+                  <a:srgbClr val="0F0F0F"/>
+                </a:solidFill>
+                <a:effectLst/>
+                <a:latin typeface="Söhne"/>
+              </a:rPr>
+              <a:t>Create a Python program that will plot the rate of flow that water will drain out of the tank over time. Assume we have a 10 liter tank and there is a hole at the bottom of the tank that is 2 cm in diameter. Make whatever assumptions that are </a:t>
+            </a:r>
+            <a:r>
+              <a:rPr lang="en-US" b="0" i="0" dirty="0" err="1">
+                <a:solidFill>
+                  <a:srgbClr val="0F0F0F"/>
+                </a:solidFill>
+                <a:effectLst/>
+                <a:latin typeface="Söhne"/>
+              </a:rPr>
+              <a:t>resasonable</a:t>
+            </a:r>
+            <a:r>
+              <a:rPr lang="en-US" b="0" i="0" dirty="0">
+                <a:solidFill>
+                  <a:srgbClr val="0F0F0F"/>
+                </a:solidFill>
+                <a:effectLst/>
+                <a:latin typeface="Söhne"/>
+              </a:rPr>
+              <a:t>.</a:t>
+            </a:r>
+            <a:endParaRPr lang="en-US" b="0" i="0" dirty="0">
+              <a:solidFill>
+                <a:srgbClr val="374151"/>
+              </a:solidFill>
+              <a:effectLst/>
+              <a:latin typeface="Söhne"/>
+            </a:endParaRPr>
+          </a:p>
+          <a:p>
+            <a:pPr marL="0" indent="0" algn="l">
+              <a:buNone/>
+            </a:pPr>
+            <a:endParaRPr lang="en-US" dirty="0">
+              <a:solidFill>
+                <a:srgbClr val="374151"/>
+              </a:solidFill>
+              <a:latin typeface="Söhne"/>
+            </a:endParaRPr>
+          </a:p>
+          <a:p>
+            <a:pPr marL="0" indent="0" algn="l">
+              <a:buNone/>
+            </a:pPr>
+            <a:endParaRPr lang="en-US" b="0" i="0" dirty="0">
+              <a:solidFill>
+                <a:srgbClr val="374151"/>
+              </a:solidFill>
+              <a:effectLst/>
+              <a:latin typeface="Söhne"/>
+            </a:endParaRPr>
+          </a:p>
+          <a:p>
+            <a:pPr marL="0" indent="0" algn="l">
+              <a:buNone/>
+            </a:pPr>
+            <a:r>
+              <a:rPr lang="en-US" b="0" i="0" dirty="0">
+                <a:solidFill>
+                  <a:srgbClr val="374151"/>
+                </a:solidFill>
+                <a:effectLst/>
+                <a:latin typeface="Söhne"/>
+              </a:rPr>
+              <a:t>To create a Python program that simulates and plots the rate of flow of water draining from a tank, we need to consider several aspects:</a:t>
+            </a:r>
+          </a:p>
+          <a:p>
+            <a:pPr marL="0" indent="0" algn="l">
+              <a:buNone/>
+            </a:pPr>
+            <a:r>
+              <a:rPr lang="en-US" b="1" i="0" dirty="0">
+                <a:solidFill>
+                  <a:srgbClr val="374151"/>
+                </a:solidFill>
+                <a:effectLst/>
+                <a:latin typeface="Söhne"/>
+              </a:rPr>
+              <a:t>Tank Properties</a:t>
+            </a:r>
+            <a:r>
+              <a:rPr lang="en-US" b="0" i="0" dirty="0">
+                <a:solidFill>
+                  <a:srgbClr val="374151"/>
+                </a:solidFill>
+                <a:effectLst/>
+                <a:latin typeface="Söhne"/>
+              </a:rPr>
+              <a:t>: A 10-liter tank (10 liters = 0.01 cubic meters).</a:t>
+            </a:r>
+          </a:p>
+          <a:p>
+            <a:pPr marL="0" indent="0" algn="l">
+              <a:buNone/>
+            </a:pPr>
+            <a:r>
+              <a:rPr lang="en-US" b="1" i="0" dirty="0">
+                <a:solidFill>
+                  <a:srgbClr val="374151"/>
+                </a:solidFill>
+                <a:effectLst/>
+                <a:latin typeface="Söhne"/>
+              </a:rPr>
+              <a:t>Hole Properties</a:t>
+            </a:r>
+            <a:r>
+              <a:rPr lang="en-US" b="0" i="0" dirty="0">
+                <a:solidFill>
+                  <a:srgbClr val="374151"/>
+                </a:solidFill>
+                <a:effectLst/>
+                <a:latin typeface="Söhne"/>
+              </a:rPr>
+              <a:t>: A hole with a 2 cm diameter at the bottom of the tank.</a:t>
+            </a:r>
+          </a:p>
+          <a:p>
+            <a:pPr marL="0" indent="0" algn="l">
+              <a:buNone/>
+            </a:pPr>
+            <a:r>
+              <a:rPr lang="en-US" b="1" i="0" dirty="0">
+                <a:solidFill>
+                  <a:srgbClr val="374151"/>
+                </a:solidFill>
+                <a:effectLst/>
+                <a:latin typeface="Söhne"/>
+              </a:rPr>
+              <a:t>Water Properties</a:t>
+            </a:r>
+            <a:r>
+              <a:rPr lang="en-US" b="0" i="0" dirty="0">
+                <a:solidFill>
+                  <a:srgbClr val="374151"/>
+                </a:solidFill>
+                <a:effectLst/>
+                <a:latin typeface="Söhne"/>
+              </a:rPr>
+              <a:t>: We'll assume the density of water to be approximately 1000 kg/m³.</a:t>
+            </a:r>
+          </a:p>
+          <a:p>
+            <a:pPr marL="0" indent="0" algn="l">
+              <a:buNone/>
+            </a:pPr>
+            <a:r>
+              <a:rPr lang="en-US" b="1" i="0" dirty="0">
+                <a:solidFill>
+                  <a:srgbClr val="374151"/>
+                </a:solidFill>
+                <a:effectLst/>
+                <a:latin typeface="Söhne"/>
+              </a:rPr>
+              <a:t>Flow Calculation</a:t>
+            </a:r>
+            <a:r>
+              <a:rPr lang="en-US" b="0" i="0" dirty="0">
+                <a:solidFill>
+                  <a:srgbClr val="374151"/>
+                </a:solidFill>
+                <a:effectLst/>
+                <a:latin typeface="Söhne"/>
+              </a:rPr>
+              <a:t>: We can use Torricelli's Law for the velocity of the fluid leaving the tank: </a:t>
+            </a:r>
+            <a:r>
+              <a:rPr lang="en-US" b="0" i="0" dirty="0">
+                <a:solidFill>
+                  <a:srgbClr val="374151"/>
+                </a:solidFill>
+                <a:effectLst/>
+                <a:latin typeface="KaTeX_Main"/>
+              </a:rPr>
+              <a:t>�=2�ℎ</a:t>
+            </a:r>
+            <a:r>
+              <a:rPr lang="en-US" b="0" i="1" dirty="0">
+                <a:solidFill>
+                  <a:srgbClr val="374151"/>
+                </a:solidFill>
+                <a:effectLst/>
+                <a:latin typeface="KaTeX_Math"/>
+              </a:rPr>
+              <a:t>v</a:t>
+            </a:r>
+            <a:r>
+              <a:rPr lang="en-US" b="0" i="0" dirty="0">
+                <a:solidFill>
+                  <a:srgbClr val="374151"/>
+                </a:solidFill>
+                <a:effectLst/>
+                <a:latin typeface="KaTeX_Main"/>
+              </a:rPr>
+              <a:t>=2</a:t>
+            </a:r>
+            <a:r>
+              <a:rPr lang="en-US" b="0" i="1" dirty="0">
+                <a:solidFill>
+                  <a:srgbClr val="374151"/>
+                </a:solidFill>
+                <a:effectLst/>
+                <a:latin typeface="KaTeX_Math"/>
+              </a:rPr>
+              <a:t>gh</a:t>
+            </a:r>
+            <a:r>
+              <a:rPr lang="en-US" b="0" i="0" dirty="0">
+                <a:solidFill>
+                  <a:srgbClr val="374151"/>
+                </a:solidFill>
+                <a:effectLst/>
+                <a:latin typeface="KaTeX_Main"/>
+              </a:rPr>
+              <a:t>​</a:t>
+            </a:r>
+            <a:r>
+              <a:rPr lang="en-US" b="0" i="0" dirty="0">
+                <a:solidFill>
+                  <a:srgbClr val="374151"/>
+                </a:solidFill>
+                <a:effectLst/>
+                <a:latin typeface="Söhne"/>
+              </a:rPr>
+              <a:t>, where </a:t>
+            </a:r>
+            <a:r>
+              <a:rPr lang="en-US" b="0" i="0" dirty="0">
+                <a:solidFill>
+                  <a:srgbClr val="374151"/>
+                </a:solidFill>
+                <a:effectLst/>
+                <a:latin typeface="KaTeX_Main"/>
+              </a:rPr>
+              <a:t>�</a:t>
+            </a:r>
+            <a:r>
+              <a:rPr lang="en-US" b="0" i="1" dirty="0">
+                <a:solidFill>
+                  <a:srgbClr val="374151"/>
+                </a:solidFill>
+                <a:effectLst/>
+                <a:latin typeface="KaTeX_Math"/>
+              </a:rPr>
+              <a:t>g</a:t>
+            </a:r>
+            <a:r>
+              <a:rPr lang="en-US" b="0" i="0" dirty="0">
+                <a:solidFill>
+                  <a:srgbClr val="374151"/>
+                </a:solidFill>
+                <a:effectLst/>
+                <a:latin typeface="Söhne"/>
+              </a:rPr>
+              <a:t> is the acceleration due to gravity (9.81 m/s²) and </a:t>
+            </a:r>
+            <a:r>
+              <a:rPr lang="en-US" b="0" i="0" dirty="0" err="1">
+                <a:solidFill>
+                  <a:srgbClr val="374151"/>
+                </a:solidFill>
+                <a:effectLst/>
+                <a:latin typeface="KaTeX_Main"/>
+              </a:rPr>
+              <a:t>ℎ</a:t>
+            </a:r>
+            <a:r>
+              <a:rPr lang="en-US" b="0" i="1" dirty="0" err="1">
+                <a:solidFill>
+                  <a:srgbClr val="374151"/>
+                </a:solidFill>
+                <a:effectLst/>
+                <a:latin typeface="KaTeX_Math"/>
+              </a:rPr>
+              <a:t>h</a:t>
+            </a:r>
+            <a:r>
+              <a:rPr lang="en-US" b="0" i="0" dirty="0">
+                <a:solidFill>
+                  <a:srgbClr val="374151"/>
+                </a:solidFill>
+                <a:effectLst/>
+                <a:latin typeface="Söhne"/>
+              </a:rPr>
+              <a:t> is the height of the water above the hole.</a:t>
+            </a:r>
+          </a:p>
+          <a:p>
+            <a:pPr marL="0" indent="0" algn="l">
+              <a:buNone/>
+            </a:pPr>
+            <a:r>
+              <a:rPr lang="en-US" b="1" i="0" dirty="0">
+                <a:solidFill>
+                  <a:srgbClr val="374151"/>
+                </a:solidFill>
+                <a:effectLst/>
+                <a:latin typeface="Söhne"/>
+              </a:rPr>
+              <a:t>Flow Rate</a:t>
+            </a:r>
+            <a:r>
+              <a:rPr lang="en-US" b="0" i="0" dirty="0">
+                <a:solidFill>
+                  <a:srgbClr val="374151"/>
+                </a:solidFill>
+                <a:effectLst/>
+                <a:latin typeface="Söhne"/>
+              </a:rPr>
+              <a:t>: The flow rate </a:t>
+            </a:r>
+            <a:r>
+              <a:rPr lang="en-US" b="0" i="0" dirty="0">
+                <a:solidFill>
+                  <a:srgbClr val="374151"/>
+                </a:solidFill>
+                <a:effectLst/>
+                <a:latin typeface="KaTeX_Main"/>
+              </a:rPr>
+              <a:t>�</a:t>
+            </a:r>
+            <a:r>
+              <a:rPr lang="en-US" b="0" i="1" dirty="0">
+                <a:solidFill>
+                  <a:srgbClr val="374151"/>
+                </a:solidFill>
+                <a:effectLst/>
+                <a:latin typeface="KaTeX_Math"/>
+              </a:rPr>
+              <a:t>Q</a:t>
+            </a:r>
+            <a:r>
+              <a:rPr lang="en-US" b="0" i="0" dirty="0">
+                <a:solidFill>
+                  <a:srgbClr val="374151"/>
+                </a:solidFill>
+                <a:effectLst/>
+                <a:latin typeface="Söhne"/>
+              </a:rPr>
+              <a:t> can be calculated as </a:t>
+            </a:r>
+            <a:r>
+              <a:rPr lang="en-US" b="0" i="0" dirty="0">
+                <a:solidFill>
+                  <a:srgbClr val="374151"/>
+                </a:solidFill>
+                <a:effectLst/>
+                <a:latin typeface="KaTeX_Main"/>
+              </a:rPr>
+              <a:t>�=��</a:t>
+            </a:r>
+            <a:r>
+              <a:rPr lang="en-US" b="0" i="1" dirty="0">
+                <a:solidFill>
+                  <a:srgbClr val="374151"/>
+                </a:solidFill>
+                <a:effectLst/>
+                <a:latin typeface="KaTeX_Math"/>
+              </a:rPr>
+              <a:t>Q</a:t>
+            </a:r>
+            <a:r>
+              <a:rPr lang="en-US" b="0" i="0" dirty="0">
+                <a:solidFill>
+                  <a:srgbClr val="374151"/>
+                </a:solidFill>
+                <a:effectLst/>
+                <a:latin typeface="KaTeX_Main"/>
+              </a:rPr>
+              <a:t>=</a:t>
+            </a:r>
+            <a:r>
+              <a:rPr lang="en-US" b="0" i="1" dirty="0">
+                <a:solidFill>
+                  <a:srgbClr val="374151"/>
+                </a:solidFill>
+                <a:effectLst/>
+                <a:latin typeface="KaTeX_Math"/>
+              </a:rPr>
+              <a:t>Av</a:t>
+            </a:r>
+            <a:r>
+              <a:rPr lang="en-US" b="0" i="0" dirty="0">
+                <a:solidFill>
+                  <a:srgbClr val="374151"/>
+                </a:solidFill>
+                <a:effectLst/>
+                <a:latin typeface="Söhne"/>
+              </a:rPr>
+              <a:t>, where </a:t>
+            </a:r>
+            <a:r>
+              <a:rPr lang="en-US" b="0" i="0" dirty="0">
+                <a:solidFill>
+                  <a:srgbClr val="374151"/>
+                </a:solidFill>
+                <a:effectLst/>
+                <a:latin typeface="KaTeX_Main"/>
+              </a:rPr>
+              <a:t>�</a:t>
+            </a:r>
+            <a:r>
+              <a:rPr lang="en-US" b="0" i="1" dirty="0">
+                <a:solidFill>
+                  <a:srgbClr val="374151"/>
+                </a:solidFill>
+                <a:effectLst/>
+                <a:latin typeface="KaTeX_Math"/>
+              </a:rPr>
+              <a:t>A</a:t>
+            </a:r>
+            <a:r>
+              <a:rPr lang="en-US" b="0" i="0" dirty="0">
+                <a:solidFill>
+                  <a:srgbClr val="374151"/>
+                </a:solidFill>
+                <a:effectLst/>
+                <a:latin typeface="Söhne"/>
+              </a:rPr>
+              <a:t> is the area of the hole and </a:t>
+            </a:r>
+            <a:r>
+              <a:rPr lang="en-US" b="0" i="0" dirty="0">
+                <a:solidFill>
+                  <a:srgbClr val="374151"/>
+                </a:solidFill>
+                <a:effectLst/>
+                <a:latin typeface="KaTeX_Main"/>
+              </a:rPr>
+              <a:t>�</a:t>
+            </a:r>
+            <a:r>
+              <a:rPr lang="en-US" b="0" i="1" dirty="0">
+                <a:solidFill>
+                  <a:srgbClr val="374151"/>
+                </a:solidFill>
+                <a:effectLst/>
+                <a:latin typeface="KaTeX_Math"/>
+              </a:rPr>
+              <a:t>v</a:t>
+            </a:r>
+            <a:r>
+              <a:rPr lang="en-US" b="0" i="0" dirty="0">
+                <a:solidFill>
+                  <a:srgbClr val="374151"/>
+                </a:solidFill>
+                <a:effectLst/>
+                <a:latin typeface="Söhne"/>
+              </a:rPr>
+              <a:t> is the velocity of the water. The area </a:t>
+            </a:r>
+            <a:r>
+              <a:rPr lang="en-US" b="0" i="0" dirty="0">
+                <a:solidFill>
+                  <a:srgbClr val="374151"/>
+                </a:solidFill>
+                <a:effectLst/>
+                <a:latin typeface="KaTeX_Main"/>
+              </a:rPr>
+              <a:t>�</a:t>
+            </a:r>
+            <a:r>
+              <a:rPr lang="en-US" b="0" i="1" dirty="0">
+                <a:solidFill>
+                  <a:srgbClr val="374151"/>
+                </a:solidFill>
+                <a:effectLst/>
+                <a:latin typeface="KaTeX_Math"/>
+              </a:rPr>
+              <a:t>A</a:t>
+            </a:r>
+            <a:r>
+              <a:rPr lang="en-US" b="0" i="0" dirty="0">
+                <a:solidFill>
+                  <a:srgbClr val="374151"/>
+                </a:solidFill>
+                <a:effectLst/>
+                <a:latin typeface="Söhne"/>
+              </a:rPr>
+              <a:t> can be calculated using the formula for the area of a circle: </a:t>
+            </a:r>
+            <a:r>
+              <a:rPr lang="en-US" b="0" i="0" dirty="0">
+                <a:solidFill>
+                  <a:srgbClr val="374151"/>
+                </a:solidFill>
+                <a:effectLst/>
+                <a:latin typeface="KaTeX_Main"/>
+              </a:rPr>
+              <a:t>�=��2</a:t>
+            </a:r>
+            <a:r>
+              <a:rPr lang="en-US" b="0" i="1" dirty="0">
+                <a:solidFill>
+                  <a:srgbClr val="374151"/>
+                </a:solidFill>
+                <a:effectLst/>
+                <a:latin typeface="KaTeX_Math"/>
+              </a:rPr>
+              <a:t>A</a:t>
+            </a:r>
+            <a:r>
+              <a:rPr lang="en-US" b="0" i="0" dirty="0">
+                <a:solidFill>
+                  <a:srgbClr val="374151"/>
+                </a:solidFill>
+                <a:effectLst/>
+                <a:latin typeface="KaTeX_Main"/>
+              </a:rPr>
+              <a:t>=</a:t>
+            </a:r>
+            <a:r>
+              <a:rPr lang="el-GR" b="0" i="1" dirty="0">
+                <a:solidFill>
+                  <a:srgbClr val="374151"/>
+                </a:solidFill>
+                <a:effectLst/>
+                <a:latin typeface="KaTeX_Math"/>
+              </a:rPr>
+              <a:t>π</a:t>
+            </a:r>
+            <a:r>
+              <a:rPr lang="en-US" b="0" i="1" dirty="0">
+                <a:solidFill>
+                  <a:srgbClr val="374151"/>
+                </a:solidFill>
+                <a:effectLst/>
+                <a:latin typeface="KaTeX_Math"/>
+              </a:rPr>
+              <a:t>r</a:t>
+            </a:r>
+            <a:r>
+              <a:rPr lang="en-US" b="0" i="0" dirty="0">
+                <a:solidFill>
+                  <a:srgbClr val="374151"/>
+                </a:solidFill>
+                <a:effectLst/>
+                <a:latin typeface="KaTeX_Main"/>
+              </a:rPr>
+              <a:t>2</a:t>
+            </a:r>
+            <a:r>
+              <a:rPr lang="en-US" b="0" i="0" dirty="0">
+                <a:solidFill>
+                  <a:srgbClr val="374151"/>
+                </a:solidFill>
+                <a:effectLst/>
+                <a:latin typeface="Söhne"/>
+              </a:rPr>
+              <a:t>.</a:t>
+            </a:r>
+          </a:p>
+          <a:p>
+            <a:pPr marL="0" indent="0" algn="l">
+              <a:buNone/>
+            </a:pPr>
+            <a:r>
+              <a:rPr lang="en-US" b="1" i="0" dirty="0">
+                <a:solidFill>
+                  <a:srgbClr val="374151"/>
+                </a:solidFill>
+                <a:effectLst/>
+                <a:latin typeface="Söhne"/>
+              </a:rPr>
+              <a:t>Time Evolution</a:t>
+            </a:r>
+            <a:r>
+              <a:rPr lang="en-US" b="0" i="0" dirty="0">
+                <a:solidFill>
+                  <a:srgbClr val="374151"/>
+                </a:solidFill>
+                <a:effectLst/>
+                <a:latin typeface="Söhne"/>
+              </a:rPr>
+              <a:t>: We'll simulate how the height of the water decreases over time. This requires updating the height </a:t>
+            </a:r>
+            <a:r>
+              <a:rPr lang="en-US" b="0" i="0" dirty="0" err="1">
+                <a:solidFill>
+                  <a:srgbClr val="374151"/>
+                </a:solidFill>
+                <a:effectLst/>
+                <a:latin typeface="KaTeX_Main"/>
+              </a:rPr>
+              <a:t>ℎ</a:t>
+            </a:r>
+            <a:r>
+              <a:rPr lang="en-US" b="0" i="1" dirty="0" err="1">
+                <a:solidFill>
+                  <a:srgbClr val="374151"/>
+                </a:solidFill>
+                <a:effectLst/>
+                <a:latin typeface="KaTeX_Math"/>
+              </a:rPr>
+              <a:t>h</a:t>
+            </a:r>
+            <a:r>
+              <a:rPr lang="en-US" b="0" i="0" dirty="0">
+                <a:solidFill>
+                  <a:srgbClr val="374151"/>
+                </a:solidFill>
+                <a:effectLst/>
+                <a:latin typeface="Söhne"/>
+              </a:rPr>
+              <a:t> as the water drains and recalculating the flow rate.</a:t>
+            </a:r>
+          </a:p>
+          <a:p>
+            <a:pPr marL="0" indent="0" algn="l">
+              <a:buNone/>
+            </a:pPr>
+            <a:r>
+              <a:rPr lang="en-US" b="1" i="0" dirty="0">
+                <a:solidFill>
+                  <a:srgbClr val="374151"/>
+                </a:solidFill>
+                <a:effectLst/>
+                <a:latin typeface="Söhne"/>
+              </a:rPr>
+              <a:t>Assumptions</a:t>
+            </a:r>
+            <a:r>
+              <a:rPr lang="en-US" b="0" i="0" dirty="0">
+                <a:solidFill>
+                  <a:srgbClr val="374151"/>
+                </a:solidFill>
+                <a:effectLst/>
+                <a:latin typeface="Söhne"/>
+              </a:rPr>
+              <a:t>: We'll assume the tank maintains a constant cross-sectional area and ignore factors like air resistance and viscosity for simplicity.</a:t>
+            </a:r>
+          </a:p>
+          <a:p>
+            <a:pPr marL="0" indent="0" algn="l">
+              <a:buNone/>
+            </a:pPr>
+            <a:r>
+              <a:rPr lang="en-US" b="0" i="0" dirty="0">
+                <a:solidFill>
+                  <a:srgbClr val="374151"/>
+                </a:solidFill>
+                <a:effectLst/>
+                <a:latin typeface="Söhne"/>
+              </a:rPr>
+              <a:t>Let's write the program and plot the results:</a:t>
+            </a:r>
+          </a:p>
+          <a:p>
+            <a:pPr marL="0" indent="0">
+              <a:buNone/>
+            </a:pPr>
+            <a:endParaRPr lang="en-US" dirty="0"/>
+          </a:p>
+        </p:txBody>
+      </p:sp>
+    </p:spTree>
+    <p:extLst>
+      <p:ext uri="{BB962C8B-B14F-4D97-AF65-F5344CB8AC3E}">
+        <p14:creationId xmlns:p14="http://schemas.microsoft.com/office/powerpoint/2010/main" val="452260547"/>
+      </p:ext>
+    </p:extLst>
+  </p:cSld>
+  <p:clrMapOvr>
+    <a:masterClrMapping/>
+  </p:clrMapOvr>
+</p:sld>
+</file>
+
+<file path=ppt/slides/slide6.xml><?xml version="1.0" encoding="utf-8"?>
+<p:sld xmlns:a="http://schemas.openxmlformats.org/drawingml/2006/main" xmlns:r="http://schemas.openxmlformats.org/officeDocument/2006/relationships" xmlns:p="http://schemas.openxmlformats.org/presentationml/2006/main">
+  <p:cSld>
+    <p:spTree>
+      <p:nvGrpSpPr>
+        <p:cNvPr id="1" name=""/>
+        <p:cNvGrpSpPr/>
+        <p:nvPr/>
+      </p:nvGrpSpPr>
+      <p:grpSpPr>
+        <a:xfrm>
+          <a:off x="0" y="0"/>
+          <a:ext cx="0" cy="0"/>
+          <a:chOff x="0" y="0"/>
+          <a:chExt cx="0" cy="0"/>
+        </a:xfrm>
+      </p:grpSpPr>
+      <p:sp>
+        <p:nvSpPr>
+          <p:cNvPr id="2" name="Title 1">
+            <a:extLst>
+              <a:ext uri="{FF2B5EF4-FFF2-40B4-BE49-F238E27FC236}">
+                <a16:creationId xmlns:a16="http://schemas.microsoft.com/office/drawing/2014/main" id="{F6DA08C2-5505-1286-FE0E-56068DD1ADE6}"/>
+              </a:ext>
+            </a:extLst>
+          </p:cNvPr>
+          <p:cNvSpPr>
+            <a:spLocks noGrp="1"/>
+          </p:cNvSpPr>
+          <p:nvPr>
+            <p:ph type="title"/>
+          </p:nvPr>
+        </p:nvSpPr>
+        <p:spPr>
+          <a:xfrm>
+            <a:off x="838200" y="365125"/>
+            <a:ext cx="10515600" cy="660111"/>
+          </a:xfrm>
+        </p:spPr>
+        <p:txBody>
+          <a:bodyPr>
+            <a:normAutofit fontScale="90000"/>
+          </a:bodyPr>
+          <a:lstStyle/>
+          <a:p>
+            <a:r>
+              <a:rPr lang="en-US" dirty="0"/>
+              <a:t>Rate of Flow vs. Time</a:t>
+            </a:r>
+          </a:p>
+        </p:txBody>
+      </p:sp>
+      <p:pic>
+        <p:nvPicPr>
+          <p:cNvPr id="5" name="Picture 4">
+            <a:extLst>
+              <a:ext uri="{FF2B5EF4-FFF2-40B4-BE49-F238E27FC236}">
+                <a16:creationId xmlns:a16="http://schemas.microsoft.com/office/drawing/2014/main" id="{1469D2E2-2252-BD07-4B11-201E109BA836}"/>
+              </a:ext>
+            </a:extLst>
+          </p:cNvPr>
+          <p:cNvPicPr>
+            <a:picLocks noChangeAspect="1"/>
+          </p:cNvPicPr>
+          <p:nvPr/>
+        </p:nvPicPr>
+        <p:blipFill>
+          <a:blip r:embed="rId2"/>
+          <a:stretch>
+            <a:fillRect/>
+          </a:stretch>
+        </p:blipFill>
+        <p:spPr>
+          <a:xfrm>
+            <a:off x="2015836" y="1371162"/>
+            <a:ext cx="7772400" cy="4919240"/>
+          </a:xfrm>
+          <a:prstGeom prst="rect">
+            <a:avLst/>
+          </a:prstGeom>
+        </p:spPr>
+      </p:pic>
+    </p:spTree>
+    <p:extLst>
+      <p:ext uri="{BB962C8B-B14F-4D97-AF65-F5344CB8AC3E}">
+        <p14:creationId xmlns:p14="http://schemas.microsoft.com/office/powerpoint/2010/main" val="4113437237"/>
+      </p:ext>
+    </p:extLst>
+  </p:cSld>
+  <p:clrMapOvr>
+    <a:masterClrMapping/>
+  </p:clrMapOvr>
+</p:sld>
+</file>
+
+<file path=ppt/slides/slide7.xml><?xml version="1.0" encoding="utf-8"?>
+<p:sld xmlns:a="http://schemas.openxmlformats.org/drawingml/2006/main" xmlns:r="http://schemas.openxmlformats.org/officeDocument/2006/relationships" xmlns:p="http://schemas.openxmlformats.org/presentationml/2006/main">
+  <p:cSld>
+    <p:spTree>
+      <p:nvGrpSpPr>
+        <p:cNvPr id="1" name=""/>
+        <p:cNvGrpSpPr/>
+        <p:nvPr/>
+      </p:nvGrpSpPr>
+      <p:grpSpPr>
+        <a:xfrm>
+          <a:off x="0" y="0"/>
+          <a:ext cx="0" cy="0"/>
+          <a:chOff x="0" y="0"/>
+          <a:chExt cx="0" cy="0"/>
+        </a:xfrm>
+      </p:grpSpPr>
+      <p:sp>
+        <p:nvSpPr>
+          <p:cNvPr id="2" name="Title 1">
+            <a:extLst>
+              <a:ext uri="{FF2B5EF4-FFF2-40B4-BE49-F238E27FC236}">
+                <a16:creationId xmlns:a16="http://schemas.microsoft.com/office/drawing/2014/main" id="{50093E07-0101-B0A3-8DB1-A3364EFFF1B3}"/>
+              </a:ext>
+            </a:extLst>
+          </p:cNvPr>
+          <p:cNvSpPr>
+            <a:spLocks noGrp="1"/>
+          </p:cNvSpPr>
+          <p:nvPr>
+            <p:ph type="title"/>
+          </p:nvPr>
+        </p:nvSpPr>
+        <p:spPr/>
+        <p:txBody>
+          <a:bodyPr/>
+          <a:lstStyle/>
+          <a:p>
+            <a:r>
+              <a:rPr lang="en-US" dirty="0"/>
+              <a:t>Height of Water Over Time</a:t>
+            </a:r>
+          </a:p>
+        </p:txBody>
+      </p:sp>
+      <p:pic>
+        <p:nvPicPr>
+          <p:cNvPr id="5" name="Picture 4">
+            <a:extLst>
+              <a:ext uri="{FF2B5EF4-FFF2-40B4-BE49-F238E27FC236}">
+                <a16:creationId xmlns:a16="http://schemas.microsoft.com/office/drawing/2014/main" id="{E826B7A1-C2A3-56F8-4096-586AE6506830}"/>
+              </a:ext>
+            </a:extLst>
+          </p:cNvPr>
+          <p:cNvPicPr>
+            <a:picLocks noChangeAspect="1"/>
+          </p:cNvPicPr>
+          <p:nvPr/>
+        </p:nvPicPr>
+        <p:blipFill>
+          <a:blip r:embed="rId2"/>
+          <a:stretch>
+            <a:fillRect/>
+          </a:stretch>
+        </p:blipFill>
+        <p:spPr>
+          <a:xfrm>
+            <a:off x="1697182" y="1554379"/>
+            <a:ext cx="7772400" cy="5070960"/>
+          </a:xfrm>
+          <a:prstGeom prst="rect">
+            <a:avLst/>
+          </a:prstGeom>
+        </p:spPr>
+      </p:pic>
+    </p:spTree>
+    <p:extLst>
+      <p:ext uri="{BB962C8B-B14F-4D97-AF65-F5344CB8AC3E}">
+        <p14:creationId xmlns:p14="http://schemas.microsoft.com/office/powerpoint/2010/main" val="2043832517"/>
       </p:ext>
     </p:extLst>
   </p:cSld>

</xml_diff>

<commit_message>
Deployed b481bd4 with MkDocs version: 1.5.3
</commit_message>
<xml_diff>
--- a/sims/bathtub/Bathtub-Simulation.pptx
+++ b/sims/bathtub/Bathtub-Simulation.pptx
@@ -12,6 +12,7 @@
     <p:sldId id="261" r:id="rId6"/>
     <p:sldId id="262" r:id="rId7"/>
     <p:sldId id="260" r:id="rId8"/>
+    <p:sldId id="263" r:id="rId9"/>
   </p:sldIdLst>
   <p:sldSz cx="12192000" cy="6858000"/>
   <p:notesSz cx="6858000" cy="9144000"/>
@@ -6371,6 +6372,457 @@
 </p:sld>
 </file>
 
+<file path=ppt/slides/slide8.xml><?xml version="1.0" encoding="utf-8"?>
+<p:sld xmlns:a="http://schemas.openxmlformats.org/drawingml/2006/main" xmlns:r="http://schemas.openxmlformats.org/officeDocument/2006/relationships" xmlns:p="http://schemas.openxmlformats.org/presentationml/2006/main">
+  <p:cSld>
+    <p:spTree>
+      <p:nvGrpSpPr>
+        <p:cNvPr id="1" name=""/>
+        <p:cNvGrpSpPr/>
+        <p:nvPr/>
+      </p:nvGrpSpPr>
+      <p:grpSpPr>
+        <a:xfrm>
+          <a:off x="0" y="0"/>
+          <a:ext cx="0" cy="0"/>
+          <a:chOff x="0" y="0"/>
+          <a:chExt cx="0" cy="0"/>
+        </a:xfrm>
+      </p:grpSpPr>
+      <p:sp>
+        <p:nvSpPr>
+          <p:cNvPr id="2" name="Title 1">
+            <a:extLst>
+              <a:ext uri="{FF2B5EF4-FFF2-40B4-BE49-F238E27FC236}">
+                <a16:creationId xmlns:a16="http://schemas.microsoft.com/office/drawing/2014/main" id="{41998F31-DDE7-6DD9-548B-6AC585EFBC22}"/>
+              </a:ext>
+            </a:extLst>
+          </p:cNvPr>
+          <p:cNvSpPr>
+            <a:spLocks noGrp="1"/>
+          </p:cNvSpPr>
+          <p:nvPr>
+            <p:ph type="title"/>
+          </p:nvPr>
+        </p:nvSpPr>
+        <p:spPr>
+          <a:xfrm>
+            <a:off x="838200" y="365126"/>
+            <a:ext cx="10515600" cy="439106"/>
+          </a:xfrm>
+        </p:spPr>
+        <p:txBody>
+          <a:bodyPr>
+            <a:normAutofit fontScale="90000"/>
+          </a:bodyPr>
+          <a:lstStyle/>
+          <a:p>
+            <a:r>
+              <a:rPr lang="en-US" dirty="0"/>
+              <a:t>Python Code</a:t>
+            </a:r>
+          </a:p>
+        </p:txBody>
+      </p:sp>
+      <p:sp>
+        <p:nvSpPr>
+          <p:cNvPr id="3" name="Content Placeholder 2">
+            <a:extLst>
+              <a:ext uri="{FF2B5EF4-FFF2-40B4-BE49-F238E27FC236}">
+                <a16:creationId xmlns:a16="http://schemas.microsoft.com/office/drawing/2014/main" id="{3DB7E8FA-CA62-1C34-FE70-46C6BA16B194}"/>
+              </a:ext>
+            </a:extLst>
+          </p:cNvPr>
+          <p:cNvSpPr>
+            <a:spLocks noGrp="1"/>
+          </p:cNvSpPr>
+          <p:nvPr>
+            <p:ph idx="1"/>
+          </p:nvPr>
+        </p:nvSpPr>
+        <p:spPr>
+          <a:xfrm>
+            <a:off x="838200" y="1087494"/>
+            <a:ext cx="10515600" cy="5103986"/>
+          </a:xfrm>
+        </p:spPr>
+        <p:txBody>
+          <a:bodyPr>
+            <a:normAutofit fontScale="25000" lnSpcReduction="20000"/>
+          </a:bodyPr>
+          <a:lstStyle/>
+          <a:p>
+            <a:pPr marL="0" indent="0">
+              <a:buNone/>
+            </a:pPr>
+            <a:r>
+              <a:rPr lang="en-US" dirty="0"/>
+              <a:t># Re-running the simulation to track the height of the water over time</a:t>
+            </a:r>
+          </a:p>
+          <a:p>
+            <a:pPr marL="0" indent="0">
+              <a:buNone/>
+            </a:pPr>
+            <a:endParaRPr lang="en-US" dirty="0"/>
+          </a:p>
+          <a:p>
+            <a:pPr marL="0" indent="0">
+              <a:buNone/>
+            </a:pPr>
+            <a:r>
+              <a:rPr lang="en-US" dirty="0"/>
+              <a:t># Reset initial conditions</a:t>
+            </a:r>
+          </a:p>
+          <a:p>
+            <a:pPr marL="0" indent="0">
+              <a:buNone/>
+            </a:pPr>
+            <a:r>
+              <a:rPr lang="en-US" dirty="0"/>
+              <a:t>height = </a:t>
+            </a:r>
+            <a:r>
+              <a:rPr lang="en-US" dirty="0" err="1"/>
+              <a:t>initial_height</a:t>
+            </a:r>
+            <a:endParaRPr lang="en-US" dirty="0"/>
+          </a:p>
+          <a:p>
+            <a:pPr marL="0" indent="0">
+              <a:buNone/>
+            </a:pPr>
+            <a:r>
+              <a:rPr lang="en-US" dirty="0" err="1"/>
+              <a:t>height_over_time</a:t>
+            </a:r>
+            <a:r>
+              <a:rPr lang="en-US" dirty="0"/>
+              <a:t> = []</a:t>
+            </a:r>
+          </a:p>
+          <a:p>
+            <a:pPr marL="0" indent="0">
+              <a:buNone/>
+            </a:pPr>
+            <a:endParaRPr lang="en-US" dirty="0"/>
+          </a:p>
+          <a:p>
+            <a:pPr marL="0" indent="0">
+              <a:buNone/>
+            </a:pPr>
+            <a:r>
+              <a:rPr lang="en-US" dirty="0"/>
+              <a:t># Re-simulate</a:t>
+            </a:r>
+          </a:p>
+          <a:p>
+            <a:pPr marL="0" indent="0">
+              <a:buNone/>
+            </a:pPr>
+            <a:r>
+              <a:rPr lang="en-US" dirty="0"/>
+              <a:t>for t in </a:t>
+            </a:r>
+            <a:r>
+              <a:rPr lang="en-US" dirty="0" err="1"/>
+              <a:t>np.arange</a:t>
+            </a:r>
+            <a:r>
+              <a:rPr lang="en-US" dirty="0"/>
+              <a:t>(0, </a:t>
+            </a:r>
+            <a:r>
+              <a:rPr lang="en-US" dirty="0" err="1"/>
+              <a:t>max_time</a:t>
+            </a:r>
+            <a:r>
+              <a:rPr lang="en-US" dirty="0"/>
+              <a:t>, </a:t>
+            </a:r>
+            <a:r>
+              <a:rPr lang="en-US" dirty="0" err="1"/>
+              <a:t>time_step</a:t>
+            </a:r>
+            <a:r>
+              <a:rPr lang="en-US" dirty="0"/>
+              <a:t>):</a:t>
+            </a:r>
+          </a:p>
+          <a:p>
+            <a:pPr marL="0" indent="0">
+              <a:buNone/>
+            </a:pPr>
+            <a:r>
+              <a:rPr lang="en-US" dirty="0"/>
+              <a:t>    if height &lt;= 0:</a:t>
+            </a:r>
+          </a:p>
+          <a:p>
+            <a:pPr marL="0" indent="0">
+              <a:buNone/>
+            </a:pPr>
+            <a:r>
+              <a:rPr lang="en-US" dirty="0"/>
+              <a:t>        break</a:t>
+            </a:r>
+          </a:p>
+          <a:p>
+            <a:pPr marL="0" indent="0">
+              <a:buNone/>
+            </a:pPr>
+            <a:endParaRPr lang="en-US" dirty="0"/>
+          </a:p>
+          <a:p>
+            <a:pPr marL="0" indent="0">
+              <a:buNone/>
+            </a:pPr>
+            <a:r>
+              <a:rPr lang="en-US" dirty="0"/>
+              <a:t>    velocity = </a:t>
+            </a:r>
+            <a:r>
+              <a:rPr lang="en-US" dirty="0" err="1"/>
+              <a:t>np.sqrt</a:t>
+            </a:r>
+            <a:r>
+              <a:rPr lang="en-US" dirty="0"/>
+              <a:t>(2 * g * height)</a:t>
+            </a:r>
+          </a:p>
+          <a:p>
+            <a:pPr marL="0" indent="0">
+              <a:buNone/>
+            </a:pPr>
+            <a:r>
+              <a:rPr lang="en-US" dirty="0"/>
+              <a:t>    </a:t>
+            </a:r>
+            <a:r>
+              <a:rPr lang="en-US" dirty="0" err="1"/>
+              <a:t>current_flow_rate</a:t>
+            </a:r>
+            <a:r>
+              <a:rPr lang="en-US" dirty="0"/>
+              <a:t> = </a:t>
+            </a:r>
+            <a:r>
+              <a:rPr lang="en-US" dirty="0" err="1"/>
+              <a:t>hole_area</a:t>
+            </a:r>
+            <a:r>
+              <a:rPr lang="en-US" dirty="0"/>
+              <a:t> * velocity</a:t>
+            </a:r>
+          </a:p>
+          <a:p>
+            <a:pPr marL="0" indent="0">
+              <a:buNone/>
+            </a:pPr>
+            <a:r>
+              <a:rPr lang="en-US" dirty="0"/>
+              <a:t>    height -= </a:t>
+            </a:r>
+            <a:r>
+              <a:rPr lang="en-US" dirty="0" err="1"/>
+              <a:t>current_flow_rate</a:t>
+            </a:r>
+            <a:r>
+              <a:rPr lang="en-US" dirty="0"/>
+              <a:t> * </a:t>
+            </a:r>
+            <a:r>
+              <a:rPr lang="en-US" dirty="0" err="1"/>
+              <a:t>time_step</a:t>
+            </a:r>
+            <a:r>
+              <a:rPr lang="en-US" dirty="0"/>
+              <a:t> / (</a:t>
+            </a:r>
+            <a:r>
+              <a:rPr lang="en-US" dirty="0" err="1"/>
+              <a:t>np.pi</a:t>
+            </a:r>
+            <a:r>
+              <a:rPr lang="en-US" dirty="0"/>
+              <a:t> * </a:t>
+            </a:r>
+            <a:r>
+              <a:rPr lang="en-US" dirty="0" err="1"/>
+              <a:t>hole_radius</a:t>
+            </a:r>
+            <a:r>
+              <a:rPr lang="en-US" dirty="0"/>
+              <a:t>**2)</a:t>
+            </a:r>
+          </a:p>
+          <a:p>
+            <a:pPr marL="0" indent="0">
+              <a:buNone/>
+            </a:pPr>
+            <a:endParaRPr lang="en-US" dirty="0"/>
+          </a:p>
+          <a:p>
+            <a:pPr marL="0" indent="0">
+              <a:buNone/>
+            </a:pPr>
+            <a:r>
+              <a:rPr lang="en-US" dirty="0"/>
+              <a:t>    </a:t>
+            </a:r>
+            <a:r>
+              <a:rPr lang="en-US" dirty="0" err="1"/>
+              <a:t>height_over_time.append</a:t>
+            </a:r>
+            <a:r>
+              <a:rPr lang="en-US" dirty="0"/>
+              <a:t>(height)</a:t>
+            </a:r>
+          </a:p>
+          <a:p>
+            <a:pPr marL="0" indent="0">
+              <a:buNone/>
+            </a:pPr>
+            <a:endParaRPr lang="en-US" dirty="0"/>
+          </a:p>
+          <a:p>
+            <a:pPr marL="0" indent="0">
+              <a:buNone/>
+            </a:pPr>
+            <a:r>
+              <a:rPr lang="en-US" dirty="0"/>
+              <a:t># Plotting the results</a:t>
+            </a:r>
+          </a:p>
+          <a:p>
+            <a:pPr marL="0" indent="0">
+              <a:buNone/>
+            </a:pPr>
+            <a:r>
+              <a:rPr lang="en-US" dirty="0" err="1"/>
+              <a:t>plt.figure</a:t>
+            </a:r>
+            <a:r>
+              <a:rPr lang="en-US" dirty="0"/>
+              <a:t>(</a:t>
+            </a:r>
+            <a:r>
+              <a:rPr lang="en-US" dirty="0" err="1"/>
+              <a:t>figsize</a:t>
+            </a:r>
+            <a:r>
+              <a:rPr lang="en-US" dirty="0"/>
+              <a:t>=(10, 6))</a:t>
+            </a:r>
+          </a:p>
+          <a:p>
+            <a:pPr marL="0" indent="0">
+              <a:buNone/>
+            </a:pPr>
+            <a:r>
+              <a:rPr lang="en-US" dirty="0" err="1"/>
+              <a:t>plt.plot</a:t>
+            </a:r>
+            <a:r>
+              <a:rPr lang="en-US" dirty="0"/>
+              <a:t>(time, </a:t>
+            </a:r>
+            <a:r>
+              <a:rPr lang="en-US" dirty="0" err="1"/>
+              <a:t>height_over_time</a:t>
+            </a:r>
+            <a:r>
+              <a:rPr lang="en-US" dirty="0"/>
+              <a:t>)</a:t>
+            </a:r>
+          </a:p>
+          <a:p>
+            <a:pPr marL="0" indent="0">
+              <a:buNone/>
+            </a:pPr>
+            <a:r>
+              <a:rPr lang="en-US" dirty="0" err="1"/>
+              <a:t>plt.title</a:t>
+            </a:r>
+            <a:r>
+              <a:rPr lang="en-US" dirty="0"/>
+              <a:t>("Height of Water in the Tank Over Time")</a:t>
+            </a:r>
+          </a:p>
+          <a:p>
+            <a:pPr marL="0" indent="0">
+              <a:buNone/>
+            </a:pPr>
+            <a:r>
+              <a:rPr lang="en-US" dirty="0" err="1"/>
+              <a:t>plt.xlabel</a:t>
+            </a:r>
+            <a:r>
+              <a:rPr lang="en-US" dirty="0"/>
+              <a:t>("Time (s)")</a:t>
+            </a:r>
+          </a:p>
+          <a:p>
+            <a:pPr marL="0" indent="0">
+              <a:buNone/>
+            </a:pPr>
+            <a:r>
+              <a:rPr lang="en-US" dirty="0" err="1"/>
+              <a:t>plt.ylabel</a:t>
+            </a:r>
+            <a:r>
+              <a:rPr lang="en-US" dirty="0"/>
+              <a:t>("Height of Water (m)")</a:t>
+            </a:r>
+          </a:p>
+          <a:p>
+            <a:pPr marL="0" indent="0">
+              <a:buNone/>
+            </a:pPr>
+            <a:r>
+              <a:rPr lang="en-US" dirty="0" err="1"/>
+              <a:t>plt.grid</a:t>
+            </a:r>
+            <a:r>
+              <a:rPr lang="en-US" dirty="0"/>
+              <a:t>(True)</a:t>
+            </a:r>
+          </a:p>
+          <a:p>
+            <a:pPr marL="0" indent="0">
+              <a:buNone/>
+            </a:pPr>
+            <a:r>
+              <a:rPr lang="en-US" dirty="0" err="1"/>
+              <a:t>plt.show</a:t>
+            </a:r>
+            <a:r>
+              <a:rPr lang="en-US" dirty="0"/>
+              <a:t>()</a:t>
+            </a:r>
+          </a:p>
+          <a:p>
+            <a:pPr marL="0" indent="0">
+              <a:buNone/>
+            </a:pPr>
+            <a:endParaRPr lang="en-US" dirty="0"/>
+          </a:p>
+        </p:txBody>
+      </p:sp>
+    </p:spTree>
+    <p:extLst>
+      <p:ext uri="{BB962C8B-B14F-4D97-AF65-F5344CB8AC3E}">
+        <p14:creationId xmlns:p14="http://schemas.microsoft.com/office/powerpoint/2010/main" val="3568580624"/>
+      </p:ext>
+    </p:extLst>
+  </p:cSld>
+  <p:clrMapOvr>
+    <a:masterClrMapping/>
+  </p:clrMapOvr>
+</p:sld>
+</file>
+
 <file path=ppt/theme/theme1.xml><?xml version="1.0" encoding="utf-8"?>
 <a:theme xmlns:a="http://schemas.openxmlformats.org/drawingml/2006/main" name="Office Theme">
   <a:themeElements>

</xml_diff>